<commit_message>
update for data model in memory & disk
</commit_message>
<xml_diff>
--- a/数据存取模型.pptx
+++ b/数据存取模型.pptx
@@ -5,7 +5,7 @@
     <p:sldMasterId id="2147483648" r:id="rId1"/>
   </p:sldMasterIdLst>
   <p:notesMasterIdLst>
-    <p:notesMasterId r:id="rId53"/>
+    <p:notesMasterId r:id="rId57"/>
   </p:notesMasterIdLst>
   <p:sldIdLst>
     <p:sldId id="256" r:id="rId2"/>
@@ -40,25 +40,29 @@
     <p:sldId id="302" r:id="rId31"/>
     <p:sldId id="303" r:id="rId32"/>
     <p:sldId id="306" r:id="rId33"/>
-    <p:sldId id="304" r:id="rId34"/>
-    <p:sldId id="305" r:id="rId35"/>
-    <p:sldId id="307" r:id="rId36"/>
-    <p:sldId id="269" r:id="rId37"/>
-    <p:sldId id="258" r:id="rId38"/>
-    <p:sldId id="259" r:id="rId39"/>
-    <p:sldId id="260" r:id="rId40"/>
-    <p:sldId id="264" r:id="rId41"/>
-    <p:sldId id="261" r:id="rId42"/>
-    <p:sldId id="263" r:id="rId43"/>
-    <p:sldId id="268" r:id="rId44"/>
-    <p:sldId id="267" r:id="rId45"/>
-    <p:sldId id="265" r:id="rId46"/>
-    <p:sldId id="257" r:id="rId47"/>
-    <p:sldId id="273" r:id="rId48"/>
-    <p:sldId id="272" r:id="rId49"/>
-    <p:sldId id="274" r:id="rId50"/>
-    <p:sldId id="275" r:id="rId51"/>
-    <p:sldId id="271" r:id="rId52"/>
+    <p:sldId id="310" r:id="rId34"/>
+    <p:sldId id="311" r:id="rId35"/>
+    <p:sldId id="304" r:id="rId36"/>
+    <p:sldId id="305" r:id="rId37"/>
+    <p:sldId id="308" r:id="rId38"/>
+    <p:sldId id="307" r:id="rId39"/>
+    <p:sldId id="309" r:id="rId40"/>
+    <p:sldId id="269" r:id="rId41"/>
+    <p:sldId id="258" r:id="rId42"/>
+    <p:sldId id="259" r:id="rId43"/>
+    <p:sldId id="260" r:id="rId44"/>
+    <p:sldId id="264" r:id="rId45"/>
+    <p:sldId id="261" r:id="rId46"/>
+    <p:sldId id="263" r:id="rId47"/>
+    <p:sldId id="268" r:id="rId48"/>
+    <p:sldId id="267" r:id="rId49"/>
+    <p:sldId id="265" r:id="rId50"/>
+    <p:sldId id="257" r:id="rId51"/>
+    <p:sldId id="273" r:id="rId52"/>
+    <p:sldId id="272" r:id="rId53"/>
+    <p:sldId id="274" r:id="rId54"/>
+    <p:sldId id="275" r:id="rId55"/>
+    <p:sldId id="271" r:id="rId56"/>
   </p:sldIdLst>
   <p:sldSz cx="9144000" cy="6858000" type="screen4x3"/>
   <p:notesSz cx="6858000" cy="9144000"/>
@@ -242,7 +246,7 @@
           <a:p>
             <a:fld id="{391FB7C5-BAD5-4A8E-A638-CD9490F15158}" type="datetimeFigureOut">
               <a:rPr lang="zh-CN" altLang="en-US" smtClean="0"/>
-              <a:t>2017-05-04</a:t>
+              <a:t>2017-05-05</a:t>
             </a:fld>
             <a:endParaRPr lang="zh-CN" altLang="en-US"/>
           </a:p>
@@ -904,7 +908,7 @@
           <a:p>
             <a:fld id="{B3C1B4BF-54A8-4AD9-A7C6-8274C6439C54}" type="slidenum">
               <a:rPr lang="zh-CN" altLang="en-US" smtClean="0"/>
-              <a:t>44</a:t>
+              <a:t>48</a:t>
             </a:fld>
             <a:endParaRPr lang="zh-CN" altLang="en-US"/>
           </a:p>
@@ -1595,7 +1599,7 @@
           <a:p>
             <a:fld id="{B3C1B4BF-54A8-4AD9-A7C6-8274C6439C54}" type="slidenum">
               <a:rPr lang="zh-CN" altLang="en-US" smtClean="0"/>
-              <a:t>45</a:t>
+              <a:t>49</a:t>
             </a:fld>
             <a:endParaRPr lang="zh-CN" altLang="en-US"/>
           </a:p>
@@ -3171,7 +3175,7 @@
           <a:p>
             <a:fld id="{B3C1B4BF-54A8-4AD9-A7C6-8274C6439C54}" type="slidenum">
               <a:rPr lang="zh-CN" altLang="en-US" smtClean="0"/>
-              <a:t>33</a:t>
+              <a:t>35</a:t>
             </a:fld>
             <a:endParaRPr lang="zh-CN" altLang="en-US"/>
           </a:p>
@@ -3402,7 +3406,7 @@
           <a:p>
             <a:fld id="{B3C1B4BF-54A8-4AD9-A7C6-8274C6439C54}" type="slidenum">
               <a:rPr lang="zh-CN" altLang="en-US" smtClean="0"/>
-              <a:t>35</a:t>
+              <a:t>38</a:t>
             </a:fld>
             <a:endParaRPr lang="zh-CN" altLang="en-US"/>
           </a:p>
@@ -4017,7 +4021,7 @@
           <a:p>
             <a:fld id="{B3C1B4BF-54A8-4AD9-A7C6-8274C6439C54}" type="slidenum">
               <a:rPr lang="zh-CN" altLang="en-US" smtClean="0"/>
-              <a:t>38</a:t>
+              <a:t>42</a:t>
             </a:fld>
             <a:endParaRPr lang="zh-CN" altLang="en-US"/>
           </a:p>
@@ -4217,7 +4221,7 @@
           <a:p>
             <a:fld id="{530820CF-B880-4189-942D-D702A7CBA730}" type="datetimeFigureOut">
               <a:rPr lang="zh-CN" altLang="en-US" smtClean="0"/>
-              <a:t>2017-05-04</a:t>
+              <a:t>2017-05-05</a:t>
             </a:fld>
             <a:endParaRPr lang="zh-CN" altLang="en-US"/>
           </a:p>
@@ -4382,7 +4386,7 @@
           <a:p>
             <a:fld id="{530820CF-B880-4189-942D-D702A7CBA730}" type="datetimeFigureOut">
               <a:rPr lang="zh-CN" altLang="en-US" smtClean="0"/>
-              <a:t>2017-05-04</a:t>
+              <a:t>2017-05-05</a:t>
             </a:fld>
             <a:endParaRPr lang="zh-CN" altLang="en-US"/>
           </a:p>
@@ -4557,7 +4561,7 @@
           <a:p>
             <a:fld id="{530820CF-B880-4189-942D-D702A7CBA730}" type="datetimeFigureOut">
               <a:rPr lang="zh-CN" altLang="en-US" smtClean="0"/>
-              <a:t>2017-05-04</a:t>
+              <a:t>2017-05-05</a:t>
             </a:fld>
             <a:endParaRPr lang="zh-CN" altLang="en-US"/>
           </a:p>
@@ -4722,7 +4726,7 @@
           <a:p>
             <a:fld id="{530820CF-B880-4189-942D-D702A7CBA730}" type="datetimeFigureOut">
               <a:rPr lang="zh-CN" altLang="en-US" smtClean="0"/>
-              <a:t>2017-05-04</a:t>
+              <a:t>2017-05-05</a:t>
             </a:fld>
             <a:endParaRPr lang="zh-CN" altLang="en-US"/>
           </a:p>
@@ -4963,7 +4967,7 @@
           <a:p>
             <a:fld id="{530820CF-B880-4189-942D-D702A7CBA730}" type="datetimeFigureOut">
               <a:rPr lang="zh-CN" altLang="en-US" smtClean="0"/>
-              <a:t>2017-05-04</a:t>
+              <a:t>2017-05-05</a:t>
             </a:fld>
             <a:endParaRPr lang="zh-CN" altLang="en-US"/>
           </a:p>
@@ -5246,7 +5250,7 @@
           <a:p>
             <a:fld id="{530820CF-B880-4189-942D-D702A7CBA730}" type="datetimeFigureOut">
               <a:rPr lang="zh-CN" altLang="en-US" smtClean="0"/>
-              <a:t>2017-05-04</a:t>
+              <a:t>2017-05-05</a:t>
             </a:fld>
             <a:endParaRPr lang="zh-CN" altLang="en-US"/>
           </a:p>
@@ -5663,7 +5667,7 @@
           <a:p>
             <a:fld id="{530820CF-B880-4189-942D-D702A7CBA730}" type="datetimeFigureOut">
               <a:rPr lang="zh-CN" altLang="en-US" smtClean="0"/>
-              <a:t>2017-05-04</a:t>
+              <a:t>2017-05-05</a:t>
             </a:fld>
             <a:endParaRPr lang="zh-CN" altLang="en-US"/>
           </a:p>
@@ -5776,7 +5780,7 @@
           <a:p>
             <a:fld id="{530820CF-B880-4189-942D-D702A7CBA730}" type="datetimeFigureOut">
               <a:rPr lang="zh-CN" altLang="en-US" smtClean="0"/>
-              <a:t>2017-05-04</a:t>
+              <a:t>2017-05-05</a:t>
             </a:fld>
             <a:endParaRPr lang="zh-CN" altLang="en-US"/>
           </a:p>
@@ -5866,7 +5870,7 @@
           <a:p>
             <a:fld id="{530820CF-B880-4189-942D-D702A7CBA730}" type="datetimeFigureOut">
               <a:rPr lang="zh-CN" altLang="en-US" smtClean="0"/>
-              <a:t>2017-05-04</a:t>
+              <a:t>2017-05-05</a:t>
             </a:fld>
             <a:endParaRPr lang="zh-CN" altLang="en-US"/>
           </a:p>
@@ -6138,7 +6142,7 @@
           <a:p>
             <a:fld id="{530820CF-B880-4189-942D-D702A7CBA730}" type="datetimeFigureOut">
               <a:rPr lang="zh-CN" altLang="en-US" smtClean="0"/>
-              <a:t>2017-05-04</a:t>
+              <a:t>2017-05-05</a:t>
             </a:fld>
             <a:endParaRPr lang="zh-CN" altLang="en-US"/>
           </a:p>
@@ -6386,7 +6390,7 @@
           <a:p>
             <a:fld id="{530820CF-B880-4189-942D-D702A7CBA730}" type="datetimeFigureOut">
               <a:rPr lang="zh-CN" altLang="en-US" smtClean="0"/>
-              <a:t>2017-05-04</a:t>
+              <a:t>2017-05-05</a:t>
             </a:fld>
             <a:endParaRPr lang="zh-CN" altLang="en-US"/>
           </a:p>
@@ -6594,7 +6598,7 @@
           <a:p>
             <a:fld id="{530820CF-B880-4189-942D-D702A7CBA730}" type="datetimeFigureOut">
               <a:rPr lang="zh-CN" altLang="en-US" smtClean="0"/>
-              <a:t>2017-05-04</a:t>
+              <a:t>2017-05-05</a:t>
             </a:fld>
             <a:endParaRPr lang="zh-CN" altLang="en-US"/>
           </a:p>
@@ -12629,7 +12633,7 @@
           <a:bodyPr/>
           <a:lstStyle/>
           <a:p>
-            <a:endParaRPr lang="zh-CN" altLang="en-US"/>
+            <a:endParaRPr lang="zh-CN" altLang="en-US" dirty="0"/>
           </a:p>
         </p:txBody>
       </p:sp>
@@ -12674,7 +12678,7 @@
       </p:sp>
       <p:pic>
         <p:nvPicPr>
-          <p:cNvPr id="1027" name="Picture 3"/>
+          <p:cNvPr id="1031" name="Picture 7" descr="https://www.cs.uic.edu/~jbell/CourseNotes/OperatingSystems/images/Chapter10/10_01_DiskMechanism.jpg"/>
           <p:cNvPicPr>
             <a:picLocks noChangeAspect="1" noChangeArrowheads="1"/>
           </p:cNvPicPr>
@@ -12695,57 +12699,73 @@
         </p:blipFill>
         <p:spPr bwMode="auto">
           <a:xfrm>
-            <a:off x="611560" y="3645024"/>
-            <a:ext cx="3886200" cy="3019425"/>
+            <a:off x="3131840" y="0"/>
+            <a:ext cx="5867400" cy="4305301"/>
           </a:xfrm>
           <a:prstGeom prst="rect">
             <a:avLst/>
           </a:prstGeom>
           <a:noFill/>
-          <a:ln>
-            <a:noFill/>
-          </a:ln>
-          <a:effectLst/>
           <a:extLst>
             <a:ext uri="{909E8E84-426E-40DD-AFC4-6F175D3DCCD1}">
               <a14:hiddenFill xmlns:a14="http://schemas.microsoft.com/office/drawing/2010/main">
                 <a:solidFill>
-                  <a:schemeClr val="accent1"/>
+                  <a:srgbClr val="FFFFFF"/>
                 </a:solidFill>
               </a14:hiddenFill>
-            </a:ext>
-            <a:ext uri="{91240B29-F687-4F45-9708-019B960494DF}">
-              <a14:hiddenLine xmlns:a14="http://schemas.microsoft.com/office/drawing/2010/main" w="9525">
-                <a:solidFill>
-                  <a:schemeClr val="tx1"/>
-                </a:solidFill>
-                <a:miter lim="800000"/>
-                <a:headEnd/>
-                <a:tailEnd/>
-              </a14:hiddenLine>
-            </a:ext>
-            <a:ext uri="{AF507438-7753-43E0-B8FC-AC1667EBCBE1}">
-              <a14:hiddenEffects xmlns:a14="http://schemas.microsoft.com/office/drawing/2010/main">
-                <a:effectLst>
-                  <a:outerShdw dist="35921" dir="2700000" algn="ctr" rotWithShape="0">
-                    <a:schemeClr val="bg2"/>
-                  </a:outerShdw>
-                </a:effectLst>
-              </a14:hiddenEffects>
             </a:ext>
           </a:extLst>
         </p:spPr>
       </p:pic>
+      <p:sp>
+        <p:nvSpPr>
+          <p:cNvPr id="5" name="AutoShape 2" descr="http://www.pcguide.com/ref/hdd/op/z_wdc_hdop.jpg"/>
+          <p:cNvSpPr>
+            <a:spLocks noChangeAspect="1" noChangeArrowheads="1"/>
+          </p:cNvSpPr>
+          <p:nvPr/>
+        </p:nvSpPr>
+        <p:spPr bwMode="auto">
+          <a:xfrm>
+            <a:off x="215900" y="15875"/>
+            <a:ext cx="304800" cy="304800"/>
+          </a:xfrm>
+          <a:prstGeom prst="rect">
+            <a:avLst/>
+          </a:prstGeom>
+          <a:noFill/>
+          <a:extLst>
+            <a:ext uri="{909E8E84-426E-40DD-AFC4-6F175D3DCCD1}">
+              <a14:hiddenFill xmlns:a14="http://schemas.microsoft.com/office/drawing/2010/main">
+                <a:solidFill>
+                  <a:srgbClr val="FFFFFF"/>
+                </a:solidFill>
+              </a14:hiddenFill>
+            </a:ext>
+          </a:extLst>
+        </p:spPr>
+        <p:txBody>
+          <a:bodyPr vert="horz" wrap="square" lIns="91440" tIns="45720" rIns="91440" bIns="45720" numCol="1" anchor="t" anchorCtr="0" compatLnSpc="1">
+            <a:prstTxWarp prst="textNoShape">
+              <a:avLst/>
+            </a:prstTxWarp>
+          </a:bodyPr>
+          <a:lstStyle/>
+          <a:p>
+            <a:endParaRPr lang="zh-CN" altLang="en-US"/>
+          </a:p>
+        </p:txBody>
+      </p:sp>
       <p:pic>
         <p:nvPicPr>
-          <p:cNvPr id="1029" name="Picture 5"/>
+          <p:cNvPr id="1028" name="Picture 4" descr="Laptop-hard-drive-exposed.jpg"/>
           <p:cNvPicPr>
             <a:picLocks noChangeAspect="1" noChangeArrowheads="1"/>
           </p:cNvPicPr>
           <p:nvPr/>
         </p:nvPicPr>
         <p:blipFill>
-          <a:blip r:embed="rId3">
+          <a:blip r:embed="rId3" cstate="print">
             <a:extLst>
               <a:ext uri="{28A0092B-C50C-407E-A947-70E740481C1C}">
                 <a14:useLocalDpi xmlns:a14="http://schemas.microsoft.com/office/drawing/2010/main" val="0"/>
@@ -12759,57 +12779,34 @@
         </p:blipFill>
         <p:spPr bwMode="auto">
           <a:xfrm>
-            <a:off x="4743756" y="3797423"/>
-            <a:ext cx="3981450" cy="2714625"/>
+            <a:off x="525740" y="4005064"/>
+            <a:ext cx="2985927" cy="2283768"/>
           </a:xfrm>
           <a:prstGeom prst="rect">
             <a:avLst/>
           </a:prstGeom>
           <a:noFill/>
-          <a:ln>
-            <a:noFill/>
-          </a:ln>
-          <a:effectLst/>
           <a:extLst>
             <a:ext uri="{909E8E84-426E-40DD-AFC4-6F175D3DCCD1}">
               <a14:hiddenFill xmlns:a14="http://schemas.microsoft.com/office/drawing/2010/main">
                 <a:solidFill>
-                  <a:schemeClr val="accent1"/>
+                  <a:srgbClr val="FFFFFF"/>
                 </a:solidFill>
               </a14:hiddenFill>
-            </a:ext>
-            <a:ext uri="{91240B29-F687-4F45-9708-019B960494DF}">
-              <a14:hiddenLine xmlns:a14="http://schemas.microsoft.com/office/drawing/2010/main" w="9525">
-                <a:solidFill>
-                  <a:schemeClr val="tx1"/>
-                </a:solidFill>
-                <a:miter lim="800000"/>
-                <a:headEnd/>
-                <a:tailEnd/>
-              </a14:hiddenLine>
-            </a:ext>
-            <a:ext uri="{AF507438-7753-43E0-B8FC-AC1667EBCBE1}">
-              <a14:hiddenEffects xmlns:a14="http://schemas.microsoft.com/office/drawing/2010/main">
-                <a:effectLst>
-                  <a:outerShdw dist="35921" dir="2700000" algn="ctr" rotWithShape="0">
-                    <a:schemeClr val="bg2"/>
-                  </a:outerShdw>
-                </a:effectLst>
-              </a14:hiddenEffects>
             </a:ext>
           </a:extLst>
         </p:spPr>
       </p:pic>
       <p:pic>
         <p:nvPicPr>
-          <p:cNvPr id="1031" name="Picture 7" descr="https://www.cs.uic.edu/~jbell/CourseNotes/OperatingSystems/images/Chapter10/10_01_DiskMechanism.jpg"/>
+          <p:cNvPr id="1030" name="Picture 6" descr="wd_raid_edition_hdd_inside"/>
           <p:cNvPicPr>
             <a:picLocks noChangeAspect="1" noChangeArrowheads="1"/>
           </p:cNvPicPr>
           <p:nvPr/>
         </p:nvPicPr>
         <p:blipFill>
-          <a:blip r:embed="rId4">
+          <a:blip r:embed="rId4" cstate="print">
             <a:extLst>
               <a:ext uri="{28A0092B-C50C-407E-A947-70E740481C1C}">
                 <a14:useLocalDpi xmlns:a14="http://schemas.microsoft.com/office/drawing/2010/main" val="0"/>
@@ -12823,8 +12820,8 @@
         </p:blipFill>
         <p:spPr bwMode="auto">
           <a:xfrm>
-            <a:off x="3276600" y="620688"/>
-            <a:ext cx="5867400" cy="4305301"/>
+            <a:off x="5580112" y="4316005"/>
+            <a:ext cx="3180487" cy="2329458"/>
           </a:xfrm>
           <a:prstGeom prst="rect">
             <a:avLst/>
@@ -13394,6 +13391,134 @@
           </p:txBody>
         </p:sp>
       </p:grpSp>
+      <p:pic>
+        <p:nvPicPr>
+          <p:cNvPr id="10" name="Picture 3"/>
+          <p:cNvPicPr>
+            <a:picLocks noChangeAspect="1" noChangeArrowheads="1"/>
+          </p:cNvPicPr>
+          <p:nvPr/>
+        </p:nvPicPr>
+        <p:blipFill>
+          <a:blip r:embed="rId4">
+            <a:extLst>
+              <a:ext uri="{28A0092B-C50C-407E-A947-70E740481C1C}">
+                <a14:useLocalDpi xmlns:a14="http://schemas.microsoft.com/office/drawing/2010/main" val="0"/>
+              </a:ext>
+            </a:extLst>
+          </a:blip>
+          <a:srcRect/>
+          <a:stretch>
+            <a:fillRect/>
+          </a:stretch>
+        </p:blipFill>
+        <p:spPr bwMode="auto">
+          <a:xfrm>
+            <a:off x="3779912" y="1556792"/>
+            <a:ext cx="3886200" cy="3019425"/>
+          </a:xfrm>
+          <a:prstGeom prst="rect">
+            <a:avLst/>
+          </a:prstGeom>
+          <a:noFill/>
+          <a:ln>
+            <a:noFill/>
+          </a:ln>
+          <a:effectLst/>
+          <a:extLst>
+            <a:ext uri="{909E8E84-426E-40DD-AFC4-6F175D3DCCD1}">
+              <a14:hiddenFill xmlns:a14="http://schemas.microsoft.com/office/drawing/2010/main">
+                <a:solidFill>
+                  <a:schemeClr val="accent1"/>
+                </a:solidFill>
+              </a14:hiddenFill>
+            </a:ext>
+            <a:ext uri="{91240B29-F687-4F45-9708-019B960494DF}">
+              <a14:hiddenLine xmlns:a14="http://schemas.microsoft.com/office/drawing/2010/main" w="9525">
+                <a:solidFill>
+                  <a:schemeClr val="tx1"/>
+                </a:solidFill>
+                <a:miter lim="800000"/>
+                <a:headEnd/>
+                <a:tailEnd/>
+              </a14:hiddenLine>
+            </a:ext>
+            <a:ext uri="{AF507438-7753-43E0-B8FC-AC1667EBCBE1}">
+              <a14:hiddenEffects xmlns:a14="http://schemas.microsoft.com/office/drawing/2010/main">
+                <a:effectLst>
+                  <a:outerShdw dist="35921" dir="2700000" algn="ctr" rotWithShape="0">
+                    <a:schemeClr val="bg2"/>
+                  </a:outerShdw>
+                </a:effectLst>
+              </a14:hiddenEffects>
+            </a:ext>
+          </a:extLst>
+        </p:spPr>
+      </p:pic>
+      <p:pic>
+        <p:nvPicPr>
+          <p:cNvPr id="11" name="Picture 5"/>
+          <p:cNvPicPr>
+            <a:picLocks noChangeAspect="1" noChangeArrowheads="1"/>
+          </p:cNvPicPr>
+          <p:nvPr/>
+        </p:nvPicPr>
+        <p:blipFill>
+          <a:blip r:embed="rId5">
+            <a:extLst>
+              <a:ext uri="{28A0092B-C50C-407E-A947-70E740481C1C}">
+                <a14:useLocalDpi xmlns:a14="http://schemas.microsoft.com/office/drawing/2010/main" val="0"/>
+              </a:ext>
+            </a:extLst>
+          </a:blip>
+          <a:srcRect/>
+          <a:stretch>
+            <a:fillRect/>
+          </a:stretch>
+        </p:blipFill>
+        <p:spPr bwMode="auto">
+          <a:xfrm>
+            <a:off x="4499992" y="4684018"/>
+            <a:ext cx="3981450" cy="2714625"/>
+          </a:xfrm>
+          <a:prstGeom prst="rect">
+            <a:avLst/>
+          </a:prstGeom>
+          <a:noFill/>
+          <a:ln>
+            <a:noFill/>
+          </a:ln>
+          <a:effectLst/>
+          <a:extLst>
+            <a:ext uri="{909E8E84-426E-40DD-AFC4-6F175D3DCCD1}">
+              <a14:hiddenFill xmlns:a14="http://schemas.microsoft.com/office/drawing/2010/main">
+                <a:solidFill>
+                  <a:schemeClr val="accent1"/>
+                </a:solidFill>
+              </a14:hiddenFill>
+            </a:ext>
+            <a:ext uri="{91240B29-F687-4F45-9708-019B960494DF}">
+              <a14:hiddenLine xmlns:a14="http://schemas.microsoft.com/office/drawing/2010/main" w="9525">
+                <a:solidFill>
+                  <a:schemeClr val="tx1"/>
+                </a:solidFill>
+                <a:miter lim="800000"/>
+                <a:headEnd/>
+                <a:tailEnd/>
+              </a14:hiddenLine>
+            </a:ext>
+            <a:ext uri="{AF507438-7753-43E0-B8FC-AC1667EBCBE1}">
+              <a14:hiddenEffects xmlns:a14="http://schemas.microsoft.com/office/drawing/2010/main">
+                <a:effectLst>
+                  <a:outerShdw dist="35921" dir="2700000" algn="ctr" rotWithShape="0">
+                    <a:schemeClr val="bg2"/>
+                  </a:outerShdw>
+                </a:effectLst>
+              </a14:hiddenEffects>
+            </a:ext>
+          </a:extLst>
+        </p:spPr>
+      </p:pic>
     </p:spTree>
     <p:extLst>
       <p:ext uri="{BB962C8B-B14F-4D97-AF65-F5344CB8AC3E}">
@@ -13752,7 +13877,17 @@
             <a:pPr lvl="1"/>
             <a:r>
               <a:rPr lang="en-US" altLang="zh-CN" dirty="0" smtClean="0"/>
-              <a:t>1024/16/256</a:t>
+              <a:t>E.g. 1024/16/256 </a:t>
+            </a:r>
+            <a:r>
+              <a:rPr lang="en-US" altLang="zh-CN" dirty="0" smtClean="0">
+                <a:sym typeface="Wingdings" panose="05000000000000000000" pitchFamily="2" charset="2"/>
+              </a:rPr>
+              <a:t></a:t>
+            </a:r>
+            <a:r>
+              <a:rPr lang="en-US" altLang="zh-CN" dirty="0" smtClean="0"/>
+              <a:t> 10/4/9bits</a:t>
             </a:r>
             <a:endParaRPr lang="zh-CN" altLang="en-US" dirty="0"/>
           </a:p>
@@ -13803,102 +13938,72 @@
           <a:bodyPr/>
           <a:lstStyle/>
           <a:p>
+            <a:endParaRPr lang="zh-CN" altLang="en-US"/>
+          </a:p>
+        </p:txBody>
+      </p:sp>
+      <p:sp>
+        <p:nvSpPr>
+          <p:cNvPr id="3" name="内容占位符 2"/>
+          <p:cNvSpPr>
+            <a:spLocks noGrp="1"/>
+          </p:cNvSpPr>
+          <p:nvPr>
+            <p:ph idx="1"/>
+          </p:nvPr>
+        </p:nvSpPr>
+        <p:spPr/>
+        <p:txBody>
+          <a:bodyPr/>
+          <a:lstStyle/>
+          <a:p>
             <a:r>
               <a:rPr lang="en-US" altLang="zh-CN" dirty="0" smtClean="0"/>
-              <a:t>Disk</a:t>
-            </a:r>
-            <a:r>
-              <a:rPr lang="zh-CN" altLang="en-US" dirty="0" smtClean="0"/>
-              <a:t>磁盘访问</a:t>
-            </a:r>
-            <a:endParaRPr lang="zh-CN" altLang="en-US" dirty="0"/>
-          </a:p>
-        </p:txBody>
-      </p:sp>
-      <p:sp>
-        <p:nvSpPr>
-          <p:cNvPr id="3" name="内容占位符 2"/>
-          <p:cNvSpPr>
-            <a:spLocks noGrp="1"/>
-          </p:cNvSpPr>
-          <p:nvPr>
-            <p:ph idx="1"/>
-          </p:nvPr>
-        </p:nvSpPr>
-        <p:spPr/>
-        <p:txBody>
-          <a:bodyPr>
-            <a:normAutofit/>
-          </a:bodyPr>
-          <a:lstStyle/>
-          <a:p>
-            <a:r>
-              <a:rPr lang="zh-CN" altLang="en-US" dirty="0"/>
-              <a:t>三维寻址空间（柱面号，磁头号，扇区号）</a:t>
+              <a:t>LBA(Logical Block Addressing)</a:t>
+            </a:r>
+          </a:p>
+          <a:p>
+            <a:pPr lvl="1"/>
+            <a:r>
+              <a:rPr lang="en-US" altLang="zh-CN" dirty="0" smtClean="0"/>
+              <a:t>Logical block number</a:t>
+            </a:r>
+          </a:p>
+          <a:p>
+            <a:pPr lvl="1"/>
+            <a:r>
+              <a:rPr lang="en-US" altLang="zh-CN" dirty="0" smtClean="0"/>
+              <a:t>HD controller maps it to physical CHS</a:t>
+            </a:r>
+          </a:p>
+          <a:p>
+            <a:pPr lvl="1"/>
+            <a:r>
+              <a:rPr lang="en-US" altLang="zh-CN" dirty="0" smtClean="0"/>
+              <a:t>0 -&gt; (0, 0, 1)</a:t>
+            </a:r>
+          </a:p>
+          <a:p>
+            <a:pPr lvl="1"/>
+            <a:r>
+              <a:rPr lang="en-US" altLang="zh-CN" dirty="0" smtClean="0"/>
+              <a:t>1 -&gt; (0, 0, 2)</a:t>
+            </a:r>
+          </a:p>
+          <a:p>
+            <a:pPr lvl="1"/>
+            <a:r>
+              <a:rPr lang="en-US" altLang="zh-CN" dirty="0" smtClean="0"/>
+              <a:t>File system format</a:t>
             </a:r>
             <a:endParaRPr lang="en-US" altLang="zh-CN" dirty="0"/>
-          </a:p>
-          <a:p>
-            <a:r>
-              <a:rPr lang="zh-CN" altLang="en-US" dirty="0" smtClean="0"/>
-              <a:t>一次访盘请求（读</a:t>
-            </a:r>
-            <a:r>
-              <a:rPr lang="en-US" altLang="zh-CN" dirty="0" smtClean="0"/>
-              <a:t>/</a:t>
-            </a:r>
-            <a:r>
-              <a:rPr lang="zh-CN" altLang="en-US" dirty="0" smtClean="0"/>
-              <a:t>写）完成过程由三个动作组成：</a:t>
-            </a:r>
-            <a:endParaRPr lang="en-US" altLang="zh-CN" dirty="0" smtClean="0"/>
-          </a:p>
-          <a:p>
-            <a:pPr lvl="1"/>
-            <a:r>
-              <a:rPr lang="en-US" altLang="zh-CN" dirty="0" smtClean="0"/>
-              <a:t>1</a:t>
-            </a:r>
-            <a:r>
-              <a:rPr lang="zh-CN" altLang="en-US" dirty="0"/>
-              <a:t>）寻道（时间）：磁头移动定位到指定</a:t>
-            </a:r>
-            <a:r>
-              <a:rPr lang="zh-CN" altLang="en-US" dirty="0" smtClean="0"/>
-              <a:t>磁道 </a:t>
-            </a:r>
-            <a:endParaRPr lang="en-US" altLang="zh-CN" dirty="0"/>
-          </a:p>
-          <a:p>
-            <a:pPr lvl="1"/>
-            <a:r>
-              <a:rPr lang="en-US" altLang="zh-CN" dirty="0" smtClean="0"/>
-              <a:t>2</a:t>
-            </a:r>
-            <a:r>
-              <a:rPr lang="zh-CN" altLang="en-US" dirty="0"/>
-              <a:t>）旋转延迟（时间）：等待指定扇区从磁头下旋转经过 </a:t>
-            </a:r>
-            <a:endParaRPr lang="en-US" altLang="zh-CN" dirty="0" smtClean="0"/>
-          </a:p>
-          <a:p>
-            <a:pPr lvl="1"/>
-            <a:r>
-              <a:rPr lang="en-US" altLang="zh-CN" dirty="0" smtClean="0"/>
-              <a:t>3</a:t>
-            </a:r>
-            <a:r>
-              <a:rPr lang="zh-CN" altLang="en-US" dirty="0"/>
-              <a:t>）数据传输（时间）：数据在磁盘与内存之间的实际传输</a:t>
-            </a:r>
-            <a:endParaRPr lang="en-US" altLang="zh-CN" sz="2800" dirty="0"/>
           </a:p>
         </p:txBody>
       </p:sp>
     </p:spTree>
     <p:extLst>
       <p:ext uri="{BB962C8B-B14F-4D97-AF65-F5344CB8AC3E}">
-        <p14:creationId xmlns:p14="http://schemas.microsoft.com/office/powerpoint/2010/main" val="1430556637"/>
+        <p14:creationId xmlns:p14="http://schemas.microsoft.com/office/powerpoint/2010/main" val="1158195647"/>
       </p:ext>
     </p:extLst>
   </p:cSld>
@@ -13941,8 +14046,8 @@
           <a:lstStyle/>
           <a:p>
             <a:r>
-              <a:rPr lang="zh-CN" altLang="en-US" b="1" dirty="0"/>
-              <a:t>磁盘的读写原理</a:t>
+              <a:rPr lang="en-US" altLang="zh-CN" dirty="0"/>
+              <a:t>Fragmentation</a:t>
             </a:r>
             <a:endParaRPr lang="zh-CN" altLang="en-US" dirty="0"/>
           </a:p>
@@ -13963,167 +14068,14 @@
           <a:bodyPr/>
           <a:lstStyle/>
           <a:p>
-            <a:r>
-              <a:rPr lang="zh-CN" altLang="en-US" dirty="0"/>
-              <a:t>系统</a:t>
-            </a:r>
-            <a:r>
-              <a:rPr lang="zh-CN" altLang="en-US" dirty="0" smtClean="0"/>
-              <a:t>将</a:t>
-            </a:r>
-            <a:r>
-              <a:rPr lang="zh-CN" altLang="en-US" dirty="0"/>
-              <a:t>数据</a:t>
-            </a:r>
-            <a:r>
-              <a:rPr lang="zh-CN" altLang="en-US" dirty="0" smtClean="0"/>
-              <a:t>存储</a:t>
-            </a:r>
-            <a:r>
-              <a:rPr lang="zh-CN" altLang="en-US" dirty="0"/>
-              <a:t>到磁盘上时，按柱面、磁头、扇区的方式进行，即最先是第</a:t>
-            </a:r>
-            <a:r>
-              <a:rPr lang="en-US" altLang="zh-CN" dirty="0"/>
-              <a:t>1</a:t>
-            </a:r>
-            <a:r>
-              <a:rPr lang="zh-CN" altLang="en-US" dirty="0"/>
-              <a:t>磁道的第一磁头下（也就是第</a:t>
-            </a:r>
-            <a:r>
-              <a:rPr lang="en-US" altLang="zh-CN" dirty="0"/>
-              <a:t>1</a:t>
-            </a:r>
-            <a:r>
-              <a:rPr lang="zh-CN" altLang="en-US" dirty="0"/>
-              <a:t>盘面的第一磁道）的所有扇区，然后，是同一柱面的下一磁头，</a:t>
-            </a:r>
-            <a:r>
-              <a:rPr lang="en-US" altLang="zh-CN" dirty="0"/>
-              <a:t>……</a:t>
-            </a:r>
-            <a:r>
-              <a:rPr lang="zh-CN" altLang="en-US" dirty="0"/>
-              <a:t>，一个柱面存储满后就推进到下一个柱面，直到把文件内容全部写入磁盘。</a:t>
-            </a:r>
-            <a:endParaRPr lang="zh-CN" altLang="en-US" dirty="0"/>
-          </a:p>
-        </p:txBody>
-      </p:sp>
-      <p:sp>
-        <p:nvSpPr>
-          <p:cNvPr id="4" name="矩形 3"/>
-          <p:cNvSpPr/>
-          <p:nvPr/>
-        </p:nvSpPr>
-        <p:spPr>
-          <a:xfrm>
-            <a:off x="1043608" y="4941168"/>
-            <a:ext cx="6768752" cy="646331"/>
-          </a:xfrm>
-          <a:prstGeom prst="rect">
-            <a:avLst/>
-          </a:prstGeom>
-        </p:spPr>
-        <p:txBody>
-          <a:bodyPr wrap="square">
-            <a:spAutoFit/>
-          </a:bodyPr>
-          <a:lstStyle/>
-          <a:p>
-            <a:r>
-              <a:rPr lang="zh-CN" altLang="en-US" b="1" dirty="0" smtClean="0"/>
-              <a:t>（柱面从</a:t>
-            </a:r>
-            <a:r>
-              <a:rPr lang="zh-CN" altLang="en-US" b="1" dirty="0"/>
-              <a:t>外到</a:t>
-            </a:r>
-            <a:r>
-              <a:rPr lang="zh-CN" altLang="en-US" b="1" dirty="0" smtClean="0"/>
-              <a:t>内，磁头</a:t>
-            </a:r>
-            <a:r>
-              <a:rPr lang="zh-CN" altLang="en-US" b="1" dirty="0"/>
-              <a:t>从上到下， </a:t>
-            </a:r>
-            <a:r>
-              <a:rPr lang="zh-CN" altLang="en-US" b="1" dirty="0" smtClean="0"/>
-              <a:t>扇区从小到大。</a:t>
-            </a:r>
-            <a:endParaRPr lang="en-US" altLang="zh-CN" b="1" dirty="0" smtClean="0"/>
-          </a:p>
-          <a:p>
-            <a:r>
-              <a:rPr lang="zh-CN" altLang="en-US" b="1" dirty="0" smtClean="0"/>
-              <a:t>数据</a:t>
-            </a:r>
-            <a:r>
-              <a:rPr lang="zh-CN" altLang="en-US" b="1" dirty="0"/>
-              <a:t>的读</a:t>
-            </a:r>
-            <a:r>
-              <a:rPr lang="en-US" altLang="zh-CN" b="1" dirty="0"/>
-              <a:t>/</a:t>
-            </a:r>
-            <a:r>
-              <a:rPr lang="zh-CN" altLang="en-US" b="1" dirty="0"/>
-              <a:t>写按柱面进行，而不按盘面进行，先）</a:t>
-            </a:r>
-            <a:endParaRPr lang="zh-CN" altLang="en-US" dirty="0"/>
-          </a:p>
-        </p:txBody>
-      </p:sp>
-      <p:sp>
-        <p:nvSpPr>
-          <p:cNvPr id="5" name="矩形 4"/>
-          <p:cNvSpPr/>
-          <p:nvPr/>
-        </p:nvSpPr>
-        <p:spPr>
-          <a:xfrm>
-            <a:off x="2411760" y="5975877"/>
-            <a:ext cx="4572000" cy="646331"/>
-          </a:xfrm>
-          <a:prstGeom prst="rect">
-            <a:avLst/>
-          </a:prstGeom>
-        </p:spPr>
-        <p:txBody>
-          <a:bodyPr>
-            <a:spAutoFit/>
-          </a:bodyPr>
-          <a:lstStyle/>
-          <a:p>
-            <a:r>
-              <a:rPr lang="zh-CN" altLang="en-US" dirty="0"/>
-              <a:t>在硬盘里动得最慢的</a:t>
-            </a:r>
-            <a:r>
-              <a:rPr lang="en-US" altLang="zh-CN" dirty="0"/>
-              <a:t>(</a:t>
-            </a:r>
-            <a:r>
-              <a:rPr lang="zh-CN" altLang="en-US" dirty="0"/>
-              <a:t>相对来说</a:t>
-            </a:r>
-            <a:r>
-              <a:rPr lang="en-US" altLang="zh-CN" dirty="0"/>
-              <a:t>)</a:t>
-            </a:r>
-            <a:r>
-              <a:rPr lang="zh-CN" altLang="en-US" dirty="0"/>
-              <a:t>就是传动手臂</a:t>
-            </a:r>
-            <a:endParaRPr lang="zh-CN" altLang="en-US" dirty="0"/>
+            <a:endParaRPr lang="zh-CN" altLang="en-US"/>
           </a:p>
         </p:txBody>
       </p:sp>
     </p:spTree>
     <p:extLst>
       <p:ext uri="{BB962C8B-B14F-4D97-AF65-F5344CB8AC3E}">
-        <p14:creationId xmlns:p14="http://schemas.microsoft.com/office/powerpoint/2010/main" val="2170377557"/>
+        <p14:creationId xmlns:p14="http://schemas.microsoft.com/office/powerpoint/2010/main" val="4138949533"/>
       </p:ext>
     </p:extLst>
   </p:cSld>
@@ -14165,7 +14117,15 @@
           <a:bodyPr/>
           <a:lstStyle/>
           <a:p>
-            <a:endParaRPr lang="zh-CN" altLang="en-US"/>
+            <a:r>
+              <a:rPr lang="en-US" altLang="zh-CN" dirty="0" smtClean="0"/>
+              <a:t>Disk</a:t>
+            </a:r>
+            <a:r>
+              <a:rPr lang="zh-CN" altLang="en-US" dirty="0" smtClean="0"/>
+              <a:t>磁盘访问</a:t>
+            </a:r>
+            <a:endParaRPr lang="zh-CN" altLang="en-US" dirty="0"/>
           </a:p>
         </p:txBody>
       </p:sp>
@@ -14181,95 +14141,78 @@
         </p:nvSpPr>
         <p:spPr/>
         <p:txBody>
-          <a:bodyPr/>
-          <a:lstStyle/>
-          <a:p>
-            <a:r>
-              <a:rPr lang="en-US" altLang="zh-CN" dirty="0"/>
-              <a:t>Zone Bit </a:t>
+          <a:bodyPr>
+            <a:normAutofit/>
+          </a:bodyPr>
+          <a:lstStyle/>
+          <a:p>
+            <a:r>
+              <a:rPr lang="zh-CN" altLang="en-US" dirty="0"/>
+              <a:t>三维寻址空间（柱面号，磁头号，扇区号）</a:t>
+            </a:r>
+            <a:endParaRPr lang="en-US" altLang="zh-CN" dirty="0"/>
+          </a:p>
+          <a:p>
+            <a:r>
+              <a:rPr lang="zh-CN" altLang="en-US" dirty="0" smtClean="0"/>
+              <a:t>一次访盘请求（读</a:t>
             </a:r>
             <a:r>
               <a:rPr lang="en-US" altLang="zh-CN" dirty="0" smtClean="0"/>
-              <a:t>Recording</a:t>
-            </a:r>
-            <a:endParaRPr lang="zh-CN" altLang="en-US" dirty="0"/>
-          </a:p>
-        </p:txBody>
-      </p:sp>
-      <p:pic>
-        <p:nvPicPr>
-          <p:cNvPr id="4098" name="Picture 2" descr="http://www.pcguide.com/ref/hdd/geom/z_zbr.jpg"/>
-          <p:cNvPicPr>
-            <a:picLocks noChangeAspect="1" noChangeArrowheads="1"/>
-          </p:cNvPicPr>
-          <p:nvPr/>
-        </p:nvPicPr>
-        <p:blipFill>
-          <a:blip r:embed="rId3">
-            <a:extLst>
-              <a:ext uri="{28A0092B-C50C-407E-A947-70E740481C1C}">
-                <a14:useLocalDpi xmlns:a14="http://schemas.microsoft.com/office/drawing/2010/main" val="0"/>
-              </a:ext>
-            </a:extLst>
-          </a:blip>
-          <a:srcRect/>
-          <a:stretch>
-            <a:fillRect/>
-          </a:stretch>
-        </p:blipFill>
-        <p:spPr bwMode="auto">
-          <a:xfrm>
-            <a:off x="4716016" y="2276872"/>
-            <a:ext cx="3943350" cy="3914776"/>
-          </a:xfrm>
-          <a:prstGeom prst="rect">
-            <a:avLst/>
-          </a:prstGeom>
-          <a:noFill/>
-          <a:extLst>
-            <a:ext uri="{909E8E84-426E-40DD-AFC4-6F175D3DCCD1}">
-              <a14:hiddenFill xmlns:a14="http://schemas.microsoft.com/office/drawing/2010/main">
-                <a:solidFill>
-                  <a:srgbClr val="FFFFFF"/>
-                </a:solidFill>
-              </a14:hiddenFill>
-            </a:ext>
-          </a:extLst>
-        </p:spPr>
-      </p:pic>
-      <p:sp>
-        <p:nvSpPr>
-          <p:cNvPr id="4" name="矩形 3"/>
-          <p:cNvSpPr/>
-          <p:nvPr/>
-        </p:nvSpPr>
-        <p:spPr>
-          <a:xfrm>
-            <a:off x="827584" y="2828836"/>
-            <a:ext cx="3744416" cy="1200329"/>
-          </a:xfrm>
-          <a:prstGeom prst="rect">
-            <a:avLst/>
-          </a:prstGeom>
-        </p:spPr>
-        <p:txBody>
-          <a:bodyPr wrap="square">
-            <a:spAutoFit/>
-          </a:bodyPr>
-          <a:lstStyle/>
-          <a:p>
-            <a:r>
-              <a:rPr lang="en-US" altLang="zh-CN" dirty="0"/>
-              <a:t>zone bit recording (ZBR) is a method used by disk drives to store more sectors per track on outer tracks than on inner tracks.</a:t>
-            </a:r>
-            <a:endParaRPr lang="zh-CN" altLang="en-US" dirty="0"/>
+              <a:t>/</a:t>
+            </a:r>
+            <a:r>
+              <a:rPr lang="zh-CN" altLang="en-US" dirty="0" smtClean="0"/>
+              <a:t>写）完成过程由三个动作组成：</a:t>
+            </a:r>
+            <a:endParaRPr lang="en-US" altLang="zh-CN" dirty="0" smtClean="0"/>
+          </a:p>
+          <a:p>
+            <a:pPr lvl="1"/>
+            <a:r>
+              <a:rPr lang="en-US" altLang="zh-CN" dirty="0" smtClean="0"/>
+              <a:t>1</a:t>
+            </a:r>
+            <a:r>
+              <a:rPr lang="zh-CN" altLang="en-US" dirty="0"/>
+              <a:t>）寻道（时间）：磁头移动定位到指定</a:t>
+            </a:r>
+            <a:r>
+              <a:rPr lang="zh-CN" altLang="en-US" dirty="0" smtClean="0"/>
+              <a:t>磁道 </a:t>
+            </a:r>
+            <a:endParaRPr lang="en-US" altLang="zh-CN" dirty="0"/>
+          </a:p>
+          <a:p>
+            <a:pPr lvl="1"/>
+            <a:r>
+              <a:rPr lang="en-US" altLang="zh-CN" dirty="0" smtClean="0"/>
+              <a:t>2</a:t>
+            </a:r>
+            <a:r>
+              <a:rPr lang="zh-CN" altLang="en-US" dirty="0"/>
+              <a:t>）旋转延迟（时间）：等待指定扇区从磁头下旋转经过 </a:t>
+            </a:r>
+            <a:endParaRPr lang="en-US" altLang="zh-CN" dirty="0" smtClean="0"/>
+          </a:p>
+          <a:p>
+            <a:pPr lvl="1"/>
+            <a:r>
+              <a:rPr lang="en-US" altLang="zh-CN" dirty="0" smtClean="0"/>
+              <a:t>3</a:t>
+            </a:r>
+            <a:r>
+              <a:rPr lang="zh-CN" altLang="en-US" dirty="0"/>
+              <a:t>）数据传输（时间）：数据在磁盘与内存之间的实际传输</a:t>
+            </a:r>
+            <a:endParaRPr lang="en-US" altLang="zh-CN" sz="2800" dirty="0"/>
           </a:p>
         </p:txBody>
       </p:sp>
     </p:spTree>
     <p:extLst>
       <p:ext uri="{BB962C8B-B14F-4D97-AF65-F5344CB8AC3E}">
-        <p14:creationId xmlns:p14="http://schemas.microsoft.com/office/powerpoint/2010/main" val="2415810101"/>
+        <p14:creationId xmlns:p14="http://schemas.microsoft.com/office/powerpoint/2010/main" val="1430556637"/>
       </p:ext>
     </p:extLst>
   </p:cSld>
@@ -14312,8 +14255,8 @@
           <a:lstStyle/>
           <a:p>
             <a:r>
-              <a:rPr lang="en-US" altLang="zh-CN" dirty="0" smtClean="0"/>
-              <a:t>B Tree</a:t>
+              <a:rPr lang="zh-CN" altLang="en-US" b="1" dirty="0"/>
+              <a:t>磁盘的读写原理</a:t>
             </a:r>
             <a:endParaRPr lang="zh-CN" altLang="en-US" dirty="0"/>
           </a:p>
@@ -14334,27 +14277,171 @@
           <a:bodyPr/>
           <a:lstStyle/>
           <a:p>
-            <a:endParaRPr lang="zh-CN" altLang="en-US"/>
+            <a:r>
+              <a:rPr lang="zh-CN" altLang="en-US" dirty="0"/>
+              <a:t>系统</a:t>
+            </a:r>
+            <a:r>
+              <a:rPr lang="zh-CN" altLang="en-US" dirty="0" smtClean="0"/>
+              <a:t>将</a:t>
+            </a:r>
+            <a:r>
+              <a:rPr lang="zh-CN" altLang="en-US" dirty="0"/>
+              <a:t>数据</a:t>
+            </a:r>
+            <a:r>
+              <a:rPr lang="zh-CN" altLang="en-US" dirty="0" smtClean="0"/>
+              <a:t>存储</a:t>
+            </a:r>
+            <a:r>
+              <a:rPr lang="zh-CN" altLang="en-US" dirty="0"/>
+              <a:t>到磁盘上时，按柱面、磁头、扇区的方式进行，即最先是第</a:t>
+            </a:r>
+            <a:r>
+              <a:rPr lang="en-US" altLang="zh-CN" dirty="0"/>
+              <a:t>1</a:t>
+            </a:r>
+            <a:r>
+              <a:rPr lang="zh-CN" altLang="en-US" dirty="0"/>
+              <a:t>磁道的第一磁头下（也就是第</a:t>
+            </a:r>
+            <a:r>
+              <a:rPr lang="en-US" altLang="zh-CN" dirty="0"/>
+              <a:t>1</a:t>
+            </a:r>
+            <a:r>
+              <a:rPr lang="zh-CN" altLang="en-US" dirty="0"/>
+              <a:t>盘面的第一磁道）的所有扇区，然后，是同一柱面的下一磁头，</a:t>
+            </a:r>
+            <a:r>
+              <a:rPr lang="en-US" altLang="zh-CN" dirty="0"/>
+              <a:t>……</a:t>
+            </a:r>
+            <a:r>
+              <a:rPr lang="zh-CN" altLang="en-US" dirty="0"/>
+              <a:t>，一个柱面存储满后就推进到下一个柱面，直到把文件内容全部写入磁盘。</a:t>
+            </a:r>
+          </a:p>
+        </p:txBody>
+      </p:sp>
+      <p:sp>
+        <p:nvSpPr>
+          <p:cNvPr id="4" name="矩形 3"/>
+          <p:cNvSpPr/>
+          <p:nvPr/>
+        </p:nvSpPr>
+        <p:spPr>
+          <a:xfrm>
+            <a:off x="1043608" y="4941168"/>
+            <a:ext cx="6768752" cy="646331"/>
+          </a:xfrm>
+          <a:prstGeom prst="rect">
+            <a:avLst/>
+          </a:prstGeom>
+        </p:spPr>
+        <p:txBody>
+          <a:bodyPr wrap="square">
+            <a:spAutoFit/>
+          </a:bodyPr>
+          <a:lstStyle/>
+          <a:p>
+            <a:r>
+              <a:rPr lang="zh-CN" altLang="en-US" b="1" dirty="0" smtClean="0"/>
+              <a:t>（柱面从</a:t>
+            </a:r>
+            <a:r>
+              <a:rPr lang="zh-CN" altLang="en-US" b="1" dirty="0"/>
+              <a:t>外到</a:t>
+            </a:r>
+            <a:r>
+              <a:rPr lang="zh-CN" altLang="en-US" b="1" dirty="0" smtClean="0"/>
+              <a:t>内，磁头</a:t>
+            </a:r>
+            <a:r>
+              <a:rPr lang="zh-CN" altLang="en-US" b="1" dirty="0"/>
+              <a:t>从上到下， </a:t>
+            </a:r>
+            <a:r>
+              <a:rPr lang="zh-CN" altLang="en-US" b="1" dirty="0" smtClean="0"/>
+              <a:t>扇区从小到大。</a:t>
+            </a:r>
+            <a:endParaRPr lang="en-US" altLang="zh-CN" b="1" dirty="0" smtClean="0"/>
+          </a:p>
+          <a:p>
+            <a:r>
+              <a:rPr lang="zh-CN" altLang="en-US" b="1" dirty="0" smtClean="0"/>
+              <a:t>数据</a:t>
+            </a:r>
+            <a:r>
+              <a:rPr lang="zh-CN" altLang="en-US" b="1" dirty="0"/>
+              <a:t>的读</a:t>
+            </a:r>
+            <a:r>
+              <a:rPr lang="en-US" altLang="zh-CN" b="1" dirty="0"/>
+              <a:t>/</a:t>
+            </a:r>
+            <a:r>
+              <a:rPr lang="zh-CN" altLang="en-US" b="1" dirty="0"/>
+              <a:t>写按柱面进行，而不按盘面进行，先）</a:t>
+            </a:r>
+            <a:endParaRPr lang="zh-CN" altLang="en-US" dirty="0"/>
+          </a:p>
+        </p:txBody>
+      </p:sp>
+      <p:sp>
+        <p:nvSpPr>
+          <p:cNvPr id="5" name="矩形 4"/>
+          <p:cNvSpPr/>
+          <p:nvPr/>
+        </p:nvSpPr>
+        <p:spPr>
+          <a:xfrm>
+            <a:off x="2411760" y="5975877"/>
+            <a:ext cx="4572000" cy="646331"/>
+          </a:xfrm>
+          <a:prstGeom prst="rect">
+            <a:avLst/>
+          </a:prstGeom>
+        </p:spPr>
+        <p:txBody>
+          <a:bodyPr>
+            <a:spAutoFit/>
+          </a:bodyPr>
+          <a:lstStyle/>
+          <a:p>
+            <a:r>
+              <a:rPr lang="zh-CN" altLang="en-US" dirty="0"/>
+              <a:t>在硬盘里动得最慢的</a:t>
+            </a:r>
+            <a:r>
+              <a:rPr lang="en-US" altLang="zh-CN" dirty="0"/>
+              <a:t>(</a:t>
+            </a:r>
+            <a:r>
+              <a:rPr lang="zh-CN" altLang="en-US" dirty="0"/>
+              <a:t>相对来说</a:t>
+            </a:r>
+            <a:r>
+              <a:rPr lang="en-US" altLang="zh-CN" dirty="0"/>
+              <a:t>)</a:t>
+            </a:r>
+            <a:r>
+              <a:rPr lang="zh-CN" altLang="en-US" dirty="0"/>
+              <a:t>就是传动手臂</a:t>
+            </a:r>
           </a:p>
         </p:txBody>
       </p:sp>
     </p:spTree>
     <p:extLst>
       <p:ext uri="{BB962C8B-B14F-4D97-AF65-F5344CB8AC3E}">
-        <p14:creationId xmlns:p14="http://schemas.microsoft.com/office/powerpoint/2010/main" val="1237266741"/>
+        <p14:creationId xmlns:p14="http://schemas.microsoft.com/office/powerpoint/2010/main" val="2170377557"/>
       </p:ext>
     </p:extLst>
   </p:cSld>
   <p:clrMapOvr>
     <a:masterClrMapping/>
   </p:clrMapOvr>
-  <p:timing>
-    <p:tnLst>
-      <p:par>
-        <p:cTn id="1" dur="indefinite" restart="never" nodeType="tmRoot"/>
-      </p:par>
-    </p:tnLst>
-  </p:timing>
 </p:sld>
 </file>
 
@@ -14392,7 +14479,7 @@
           <a:p>
             <a:r>
               <a:rPr lang="en-US" altLang="zh-CN" dirty="0" smtClean="0"/>
-              <a:t>B+ Tree</a:t>
+              <a:t>Sector</a:t>
             </a:r>
             <a:endParaRPr lang="zh-CN" altLang="en-US" dirty="0"/>
           </a:p>
@@ -14413,27 +14500,56 @@
           <a:bodyPr/>
           <a:lstStyle/>
           <a:p>
-            <a:endParaRPr lang="zh-CN" altLang="en-US"/>
+            <a:r>
+              <a:rPr lang="en-US" altLang="zh-CN" dirty="0" err="1" smtClean="0"/>
+              <a:t>Pyhsical</a:t>
+            </a:r>
+            <a:r>
+              <a:rPr lang="en-US" altLang="zh-CN" dirty="0" smtClean="0"/>
+              <a:t> data structure on sector</a:t>
+            </a:r>
+          </a:p>
+          <a:p>
+            <a:pPr lvl="1"/>
+            <a:r>
+              <a:rPr lang="en-US" altLang="zh-CN" dirty="0" smtClean="0"/>
+              <a:t>Sector header</a:t>
+            </a:r>
+          </a:p>
+          <a:p>
+            <a:pPr lvl="1"/>
+            <a:r>
+              <a:rPr lang="en-US" altLang="zh-CN" dirty="0" smtClean="0"/>
+              <a:t>Data area</a:t>
+            </a:r>
+          </a:p>
+          <a:p>
+            <a:pPr lvl="1"/>
+            <a:r>
+              <a:rPr lang="en-US" altLang="zh-CN" dirty="0" smtClean="0"/>
+              <a:t>Error correcting code(ECC)</a:t>
+            </a:r>
+          </a:p>
+          <a:p>
+            <a:pPr lvl="1"/>
+            <a:r>
+              <a:rPr lang="en-US" altLang="zh-CN" dirty="0" smtClean="0"/>
+              <a:t>Gaps</a:t>
+            </a:r>
+            <a:endParaRPr lang="zh-CN" altLang="en-US" dirty="0"/>
           </a:p>
         </p:txBody>
       </p:sp>
     </p:spTree>
     <p:extLst>
       <p:ext uri="{BB962C8B-B14F-4D97-AF65-F5344CB8AC3E}">
-        <p14:creationId xmlns:p14="http://schemas.microsoft.com/office/powerpoint/2010/main" val="4104151906"/>
+        <p14:creationId xmlns:p14="http://schemas.microsoft.com/office/powerpoint/2010/main" val="144081817"/>
       </p:ext>
     </p:extLst>
   </p:cSld>
   <p:clrMapOvr>
     <a:masterClrMapping/>
   </p:clrMapOvr>
-  <p:timing>
-    <p:tnLst>
-      <p:par>
-        <p:cTn id="1" dur="indefinite" restart="never" nodeType="tmRoot"/>
-      </p:par>
-    </p:tnLst>
-  </p:timing>
 </p:sld>
 </file>
 
@@ -14470,8 +14586,8 @@
           <a:lstStyle/>
           <a:p>
             <a:r>
-              <a:rPr lang="en-US" altLang="zh-CN" dirty="0" err="1" smtClean="0"/>
-              <a:t>Trie</a:t>
+              <a:rPr lang="en-US" altLang="zh-CN" dirty="0" smtClean="0"/>
+              <a:t>Confusing on sector</a:t>
             </a:r>
             <a:endParaRPr lang="zh-CN" altLang="en-US" dirty="0"/>
           </a:p>
@@ -14493,52 +14609,12 @@
           <a:lstStyle/>
           <a:p>
             <a:r>
-              <a:rPr lang="zh-CN" altLang="en-US" sz="2400" b="1" dirty="0"/>
-              <a:t>字典树的性质</a:t>
-            </a:r>
-            <a:endParaRPr lang="zh-CN" altLang="en-US" sz="2400" dirty="0"/>
-          </a:p>
-          <a:p>
-            <a:pPr lvl="1"/>
-            <a:r>
-              <a:rPr lang="zh-CN" altLang="en-US" sz="1600" dirty="0"/>
-              <a:t>根节点（</a:t>
-            </a:r>
-            <a:r>
-              <a:rPr lang="en-US" altLang="zh-CN" sz="1600" dirty="0"/>
-              <a:t>Root</a:t>
-            </a:r>
-            <a:r>
-              <a:rPr lang="zh-CN" altLang="en-US" sz="1600" dirty="0"/>
-              <a:t>）不包含字符，除根节点外的每一个节点都仅包含一个字符；</a:t>
-            </a:r>
-          </a:p>
-          <a:p>
-            <a:pPr lvl="1"/>
-            <a:r>
-              <a:rPr lang="zh-CN" altLang="en-US" sz="1600" dirty="0"/>
-              <a:t>从根节点到某一节点路径上所经过的字符连接起来，即为该节点对应的字符串；</a:t>
-            </a:r>
-          </a:p>
-          <a:p>
-            <a:pPr lvl="1"/>
-            <a:r>
-              <a:rPr lang="zh-CN" altLang="en-US" sz="1600" dirty="0"/>
-              <a:t>任意节点的所有子节点所包含的字符都不相同；</a:t>
-            </a:r>
-          </a:p>
-          <a:p>
-            <a:r>
-              <a:rPr lang="zh-CN" altLang="en-US" sz="2400" dirty="0" smtClean="0"/>
-              <a:t>例如：字符串</a:t>
-            </a:r>
-            <a:r>
-              <a:rPr lang="zh-CN" altLang="en-US" sz="2400" dirty="0"/>
-              <a:t>集合 </a:t>
-            </a:r>
-            <a:r>
-              <a:rPr lang="en-US" altLang="zh-CN" sz="2400" dirty="0"/>
-              <a:t>["Joe", "John", "Johnny", "Jane", "Jack"]</a:t>
+              <a:rPr lang="en-US" altLang="zh-CN" dirty="0"/>
+              <a:t>Zone Bit </a:t>
+            </a:r>
+            <a:r>
+              <a:rPr lang="en-US" altLang="zh-CN" dirty="0" smtClean="0"/>
+              <a:t>Recording</a:t>
             </a:r>
             <a:endParaRPr lang="zh-CN" altLang="en-US" dirty="0"/>
           </a:p>
@@ -14546,7 +14622,7 @@
       </p:sp>
       <p:pic>
         <p:nvPicPr>
-          <p:cNvPr id="1026" name="Picture 2" descr="http://images.cnitblog.com/blog/175043/201410/242258574966066.jpg"/>
+          <p:cNvPr id="4098" name="Picture 2" descr="http://www.pcguide.com/ref/hdd/geom/z_zbr.jpg"/>
           <p:cNvPicPr>
             <a:picLocks noChangeAspect="1" noChangeArrowheads="1"/>
           </p:cNvPicPr>
@@ -14567,8 +14643,8 @@
         </p:blipFill>
         <p:spPr bwMode="auto">
           <a:xfrm>
-            <a:off x="3563888" y="3429000"/>
-            <a:ext cx="2057400" cy="3152775"/>
+            <a:off x="4572000" y="1916832"/>
+            <a:ext cx="3943350" cy="3914776"/>
           </a:xfrm>
           <a:prstGeom prst="rect">
             <a:avLst/>
@@ -14585,23 +14661,173 @@
           </a:extLst>
         </p:spPr>
       </p:pic>
+      <p:sp>
+        <p:nvSpPr>
+          <p:cNvPr id="4" name="矩形 3"/>
+          <p:cNvSpPr/>
+          <p:nvPr/>
+        </p:nvSpPr>
+        <p:spPr>
+          <a:xfrm>
+            <a:off x="827584" y="2828836"/>
+            <a:ext cx="3744416" cy="1200329"/>
+          </a:xfrm>
+          <a:prstGeom prst="rect">
+            <a:avLst/>
+          </a:prstGeom>
+        </p:spPr>
+        <p:txBody>
+          <a:bodyPr wrap="square">
+            <a:spAutoFit/>
+          </a:bodyPr>
+          <a:lstStyle/>
+          <a:p>
+            <a:r>
+              <a:rPr lang="en-US" altLang="zh-CN" dirty="0"/>
+              <a:t>zone bit recording (ZBR) is a method used by disk drives to store more sectors per track on outer tracks than on inner tracks.</a:t>
+            </a:r>
+            <a:endParaRPr lang="zh-CN" altLang="en-US" dirty="0"/>
+          </a:p>
+        </p:txBody>
+      </p:sp>
+      <p:pic>
+        <p:nvPicPr>
+          <p:cNvPr id="2050" name="Picture 2"/>
+          <p:cNvPicPr>
+            <a:picLocks noChangeAspect="1" noChangeArrowheads="1"/>
+          </p:cNvPicPr>
+          <p:nvPr/>
+        </p:nvPicPr>
+        <p:blipFill>
+          <a:blip r:embed="rId4">
+            <a:extLst>
+              <a:ext uri="{28A0092B-C50C-407E-A947-70E740481C1C}">
+                <a14:useLocalDpi xmlns:a14="http://schemas.microsoft.com/office/drawing/2010/main" val="0"/>
+              </a:ext>
+            </a:extLst>
+          </a:blip>
+          <a:srcRect/>
+          <a:stretch>
+            <a:fillRect/>
+          </a:stretch>
+        </p:blipFill>
+        <p:spPr bwMode="auto">
+          <a:xfrm>
+            <a:off x="-180528" y="3296417"/>
+            <a:ext cx="4476750" cy="3581400"/>
+          </a:xfrm>
+          <a:prstGeom prst="rect">
+            <a:avLst/>
+          </a:prstGeom>
+          <a:noFill/>
+          <a:ln>
+            <a:noFill/>
+          </a:ln>
+          <a:effectLst/>
+          <a:extLst>
+            <a:ext uri="{909E8E84-426E-40DD-AFC4-6F175D3DCCD1}">
+              <a14:hiddenFill xmlns:a14="http://schemas.microsoft.com/office/drawing/2010/main">
+                <a:solidFill>
+                  <a:schemeClr val="accent1"/>
+                </a:solidFill>
+              </a14:hiddenFill>
+            </a:ext>
+            <a:ext uri="{91240B29-F687-4F45-9708-019B960494DF}">
+              <a14:hiddenLine xmlns:a14="http://schemas.microsoft.com/office/drawing/2010/main" w="9525">
+                <a:solidFill>
+                  <a:schemeClr val="tx1"/>
+                </a:solidFill>
+                <a:miter lim="800000"/>
+                <a:headEnd/>
+                <a:tailEnd/>
+              </a14:hiddenLine>
+            </a:ext>
+            <a:ext uri="{AF507438-7753-43E0-B8FC-AC1667EBCBE1}">
+              <a14:hiddenEffects xmlns:a14="http://schemas.microsoft.com/office/drawing/2010/main">
+                <a:effectLst>
+                  <a:outerShdw dist="35921" dir="2700000" algn="ctr" rotWithShape="0">
+                    <a:schemeClr val="bg2"/>
+                  </a:outerShdw>
+                </a:effectLst>
+              </a14:hiddenEffects>
+            </a:ext>
+          </a:extLst>
+        </p:spPr>
+      </p:pic>
+      <p:pic>
+        <p:nvPicPr>
+          <p:cNvPr id="2051" name="Picture 3"/>
+          <p:cNvPicPr>
+            <a:picLocks noChangeAspect="1" noChangeArrowheads="1"/>
+          </p:cNvPicPr>
+          <p:nvPr/>
+        </p:nvPicPr>
+        <p:blipFill>
+          <a:blip r:embed="rId5">
+            <a:extLst>
+              <a:ext uri="{28A0092B-C50C-407E-A947-70E740481C1C}">
+                <a14:useLocalDpi xmlns:a14="http://schemas.microsoft.com/office/drawing/2010/main" val="0"/>
+              </a:ext>
+            </a:extLst>
+          </a:blip>
+          <a:srcRect/>
+          <a:stretch>
+            <a:fillRect/>
+          </a:stretch>
+        </p:blipFill>
+        <p:spPr bwMode="auto">
+          <a:xfrm>
+            <a:off x="2555776" y="3645024"/>
+            <a:ext cx="4476750" cy="3524250"/>
+          </a:xfrm>
+          <a:prstGeom prst="rect">
+            <a:avLst/>
+          </a:prstGeom>
+          <a:noFill/>
+          <a:ln>
+            <a:noFill/>
+          </a:ln>
+          <a:effectLst/>
+          <a:extLst>
+            <a:ext uri="{909E8E84-426E-40DD-AFC4-6F175D3DCCD1}">
+              <a14:hiddenFill xmlns:a14="http://schemas.microsoft.com/office/drawing/2010/main">
+                <a:solidFill>
+                  <a:schemeClr val="accent1"/>
+                </a:solidFill>
+              </a14:hiddenFill>
+            </a:ext>
+            <a:ext uri="{91240B29-F687-4F45-9708-019B960494DF}">
+              <a14:hiddenLine xmlns:a14="http://schemas.microsoft.com/office/drawing/2010/main" w="9525">
+                <a:solidFill>
+                  <a:schemeClr val="tx1"/>
+                </a:solidFill>
+                <a:miter lim="800000"/>
+                <a:headEnd/>
+                <a:tailEnd/>
+              </a14:hiddenLine>
+            </a:ext>
+            <a:ext uri="{AF507438-7753-43E0-B8FC-AC1667EBCBE1}">
+              <a14:hiddenEffects xmlns:a14="http://schemas.microsoft.com/office/drawing/2010/main">
+                <a:effectLst>
+                  <a:outerShdw dist="35921" dir="2700000" algn="ctr" rotWithShape="0">
+                    <a:schemeClr val="bg2"/>
+                  </a:outerShdw>
+                </a:effectLst>
+              </a14:hiddenEffects>
+            </a:ext>
+          </a:extLst>
+        </p:spPr>
+      </p:pic>
     </p:spTree>
     <p:extLst>
       <p:ext uri="{BB962C8B-B14F-4D97-AF65-F5344CB8AC3E}">
-        <p14:creationId xmlns:p14="http://schemas.microsoft.com/office/powerpoint/2010/main" val="1294740302"/>
+        <p14:creationId xmlns:p14="http://schemas.microsoft.com/office/powerpoint/2010/main" val="2415810101"/>
       </p:ext>
     </p:extLst>
   </p:cSld>
   <p:clrMapOvr>
     <a:masterClrMapping/>
   </p:clrMapOvr>
-  <p:timing>
-    <p:tnLst>
-      <p:par>
-        <p:cTn id="1" dur="indefinite" restart="never" nodeType="tmRoot"/>
-      </p:par>
-    </p:tnLst>
-  </p:timing>
 </p:sld>
 </file>
 
@@ -14639,7 +14865,7 @@
           <a:p>
             <a:r>
               <a:rPr lang="en-US" altLang="zh-CN" dirty="0" smtClean="0"/>
-              <a:t>Suffix Tree</a:t>
+              <a:t>HD Sectors vs. OS Blocks</a:t>
             </a:r>
             <a:endParaRPr lang="zh-CN" altLang="en-US" dirty="0"/>
           </a:p>
@@ -14667,20 +14893,13 @@
     </p:spTree>
     <p:extLst>
       <p:ext uri="{BB962C8B-B14F-4D97-AF65-F5344CB8AC3E}">
-        <p14:creationId xmlns:p14="http://schemas.microsoft.com/office/powerpoint/2010/main" val="2284959206"/>
+        <p14:creationId xmlns:p14="http://schemas.microsoft.com/office/powerpoint/2010/main" val="3134399620"/>
       </p:ext>
     </p:extLst>
   </p:cSld>
   <p:clrMapOvr>
     <a:masterClrMapping/>
   </p:clrMapOvr>
-  <p:timing>
-    <p:tnLst>
-      <p:par>
-        <p:cTn id="1" dur="indefinite" restart="never" nodeType="tmRoot"/>
-      </p:par>
-    </p:tnLst>
-  </p:timing>
 </p:sld>
 </file>
 
@@ -14884,12 +15103,8 @@
           <a:lstStyle/>
           <a:p>
             <a:r>
-              <a:rPr lang="en-US" altLang="zh-CN" dirty="0"/>
-              <a:t>Double Array </a:t>
-            </a:r>
-            <a:r>
-              <a:rPr lang="en-US" altLang="zh-CN" dirty="0" err="1"/>
-              <a:t>Trie</a:t>
+              <a:rPr lang="en-US" altLang="zh-CN" dirty="0" smtClean="0"/>
+              <a:t>B Tree</a:t>
             </a:r>
             <a:endParaRPr lang="zh-CN" altLang="en-US" dirty="0"/>
           </a:p>
@@ -14917,7 +15132,7 @@
     </p:spTree>
     <p:extLst>
       <p:ext uri="{BB962C8B-B14F-4D97-AF65-F5344CB8AC3E}">
-        <p14:creationId xmlns:p14="http://schemas.microsoft.com/office/powerpoint/2010/main" val="3264625386"/>
+        <p14:creationId xmlns:p14="http://schemas.microsoft.com/office/powerpoint/2010/main" val="1237266741"/>
       </p:ext>
     </p:extLst>
   </p:cSld>
@@ -14968,7 +15183,7 @@
           <a:p>
             <a:r>
               <a:rPr lang="en-US" altLang="zh-CN" dirty="0" smtClean="0"/>
-              <a:t>Suffix Array</a:t>
+              <a:t>B+ Tree</a:t>
             </a:r>
             <a:endParaRPr lang="zh-CN" altLang="en-US" dirty="0"/>
           </a:p>
@@ -14996,7 +15211,7 @@
     </p:spTree>
     <p:extLst>
       <p:ext uri="{BB962C8B-B14F-4D97-AF65-F5344CB8AC3E}">
-        <p14:creationId xmlns:p14="http://schemas.microsoft.com/office/powerpoint/2010/main" val="1014942496"/>
+        <p14:creationId xmlns:p14="http://schemas.microsoft.com/office/powerpoint/2010/main" val="4104151906"/>
       </p:ext>
     </p:extLst>
   </p:cSld>
@@ -15047,7 +15262,7 @@
           <a:p>
             <a:r>
               <a:rPr lang="en-US" altLang="zh-CN" dirty="0" err="1" smtClean="0"/>
-              <a:t>SkipList</a:t>
+              <a:t>Trie</a:t>
             </a:r>
             <a:endParaRPr lang="zh-CN" altLang="en-US" dirty="0"/>
           </a:p>
@@ -15068,14 +15283,103 @@
           <a:bodyPr/>
           <a:lstStyle/>
           <a:p>
-            <a:endParaRPr lang="zh-CN" altLang="en-US"/>
-          </a:p>
-        </p:txBody>
-      </p:sp>
+            <a:r>
+              <a:rPr lang="zh-CN" altLang="en-US" sz="2400" b="1" dirty="0"/>
+              <a:t>字典树的性质</a:t>
+            </a:r>
+            <a:endParaRPr lang="zh-CN" altLang="en-US" sz="2400" dirty="0"/>
+          </a:p>
+          <a:p>
+            <a:pPr lvl="1"/>
+            <a:r>
+              <a:rPr lang="zh-CN" altLang="en-US" sz="1600" dirty="0"/>
+              <a:t>根节点（</a:t>
+            </a:r>
+            <a:r>
+              <a:rPr lang="en-US" altLang="zh-CN" sz="1600" dirty="0"/>
+              <a:t>Root</a:t>
+            </a:r>
+            <a:r>
+              <a:rPr lang="zh-CN" altLang="en-US" sz="1600" dirty="0"/>
+              <a:t>）不包含字符，除根节点外的每一个节点都仅包含一个字符；</a:t>
+            </a:r>
+          </a:p>
+          <a:p>
+            <a:pPr lvl="1"/>
+            <a:r>
+              <a:rPr lang="zh-CN" altLang="en-US" sz="1600" dirty="0"/>
+              <a:t>从根节点到某一节点路径上所经过的字符连接起来，即为该节点对应的字符串；</a:t>
+            </a:r>
+          </a:p>
+          <a:p>
+            <a:pPr lvl="1"/>
+            <a:r>
+              <a:rPr lang="zh-CN" altLang="en-US" sz="1600" dirty="0"/>
+              <a:t>任意节点的所有子节点所包含的字符都不相同；</a:t>
+            </a:r>
+          </a:p>
+          <a:p>
+            <a:r>
+              <a:rPr lang="zh-CN" altLang="en-US" sz="2400" dirty="0" smtClean="0"/>
+              <a:t>例如：字符串</a:t>
+            </a:r>
+            <a:r>
+              <a:rPr lang="zh-CN" altLang="en-US" sz="2400" dirty="0"/>
+              <a:t>集合 </a:t>
+            </a:r>
+            <a:r>
+              <a:rPr lang="en-US" altLang="zh-CN" sz="2400" dirty="0"/>
+              <a:t>["Joe", "John", "Johnny", "Jane", "Jack"]</a:t>
+            </a:r>
+            <a:endParaRPr lang="zh-CN" altLang="en-US" dirty="0"/>
+          </a:p>
+        </p:txBody>
+      </p:sp>
+      <p:pic>
+        <p:nvPicPr>
+          <p:cNvPr id="1026" name="Picture 2" descr="http://images.cnitblog.com/blog/175043/201410/242258574966066.jpg"/>
+          <p:cNvPicPr>
+            <a:picLocks noChangeAspect="1" noChangeArrowheads="1"/>
+          </p:cNvPicPr>
+          <p:nvPr/>
+        </p:nvPicPr>
+        <p:blipFill>
+          <a:blip r:embed="rId3">
+            <a:extLst>
+              <a:ext uri="{28A0092B-C50C-407E-A947-70E740481C1C}">
+                <a14:useLocalDpi xmlns:a14="http://schemas.microsoft.com/office/drawing/2010/main" val="0"/>
+              </a:ext>
+            </a:extLst>
+          </a:blip>
+          <a:srcRect/>
+          <a:stretch>
+            <a:fillRect/>
+          </a:stretch>
+        </p:blipFill>
+        <p:spPr bwMode="auto">
+          <a:xfrm>
+            <a:off x="3563888" y="3429000"/>
+            <a:ext cx="2057400" cy="3152775"/>
+          </a:xfrm>
+          <a:prstGeom prst="rect">
+            <a:avLst/>
+          </a:prstGeom>
+          <a:noFill/>
+          <a:extLst>
+            <a:ext uri="{909E8E84-426E-40DD-AFC4-6F175D3DCCD1}">
+              <a14:hiddenFill xmlns:a14="http://schemas.microsoft.com/office/drawing/2010/main">
+                <a:solidFill>
+                  <a:srgbClr val="FFFFFF"/>
+                </a:solidFill>
+              </a14:hiddenFill>
+            </a:ext>
+          </a:extLst>
+        </p:spPr>
+      </p:pic>
     </p:spTree>
     <p:extLst>
       <p:ext uri="{BB962C8B-B14F-4D97-AF65-F5344CB8AC3E}">
-        <p14:creationId xmlns:p14="http://schemas.microsoft.com/office/powerpoint/2010/main" val="1550362845"/>
+        <p14:creationId xmlns:p14="http://schemas.microsoft.com/office/powerpoint/2010/main" val="1294740302"/>
       </p:ext>
     </p:extLst>
   </p:cSld>
@@ -15126,6 +15430,326 @@
           <a:p>
             <a:r>
               <a:rPr lang="en-US" altLang="zh-CN" dirty="0" smtClean="0"/>
+              <a:t>Suffix Tree</a:t>
+            </a:r>
+            <a:endParaRPr lang="zh-CN" altLang="en-US" dirty="0"/>
+          </a:p>
+        </p:txBody>
+      </p:sp>
+      <p:sp>
+        <p:nvSpPr>
+          <p:cNvPr id="3" name="内容占位符 2"/>
+          <p:cNvSpPr>
+            <a:spLocks noGrp="1"/>
+          </p:cNvSpPr>
+          <p:nvPr>
+            <p:ph idx="1"/>
+          </p:nvPr>
+        </p:nvSpPr>
+        <p:spPr/>
+        <p:txBody>
+          <a:bodyPr/>
+          <a:lstStyle/>
+          <a:p>
+            <a:endParaRPr lang="zh-CN" altLang="en-US"/>
+          </a:p>
+        </p:txBody>
+      </p:sp>
+    </p:spTree>
+    <p:extLst>
+      <p:ext uri="{BB962C8B-B14F-4D97-AF65-F5344CB8AC3E}">
+        <p14:creationId xmlns:p14="http://schemas.microsoft.com/office/powerpoint/2010/main" val="2284959206"/>
+      </p:ext>
+    </p:extLst>
+  </p:cSld>
+  <p:clrMapOvr>
+    <a:masterClrMapping/>
+  </p:clrMapOvr>
+  <p:timing>
+    <p:tnLst>
+      <p:par>
+        <p:cTn id="1" dur="indefinite" restart="never" nodeType="tmRoot"/>
+      </p:par>
+    </p:tnLst>
+  </p:timing>
+</p:sld>
+</file>
+
+<file path=ppt/slides/slide44.xml><?xml version="1.0" encoding="utf-8"?>
+<p:sld xmlns:a="http://schemas.openxmlformats.org/drawingml/2006/main" xmlns:r="http://schemas.openxmlformats.org/officeDocument/2006/relationships" xmlns:p="http://schemas.openxmlformats.org/presentationml/2006/main">
+  <p:cSld>
+    <p:spTree>
+      <p:nvGrpSpPr>
+        <p:cNvPr id="1" name=""/>
+        <p:cNvGrpSpPr/>
+        <p:nvPr/>
+      </p:nvGrpSpPr>
+      <p:grpSpPr>
+        <a:xfrm>
+          <a:off x="0" y="0"/>
+          <a:ext cx="0" cy="0"/>
+          <a:chOff x="0" y="0"/>
+          <a:chExt cx="0" cy="0"/>
+        </a:xfrm>
+      </p:grpSpPr>
+      <p:sp>
+        <p:nvSpPr>
+          <p:cNvPr id="2" name="标题 1"/>
+          <p:cNvSpPr>
+            <a:spLocks noGrp="1"/>
+          </p:cNvSpPr>
+          <p:nvPr>
+            <p:ph type="title"/>
+          </p:nvPr>
+        </p:nvSpPr>
+        <p:spPr/>
+        <p:txBody>
+          <a:bodyPr/>
+          <a:lstStyle/>
+          <a:p>
+            <a:r>
+              <a:rPr lang="en-US" altLang="zh-CN" dirty="0"/>
+              <a:t>Double Array </a:t>
+            </a:r>
+            <a:r>
+              <a:rPr lang="en-US" altLang="zh-CN" dirty="0" err="1"/>
+              <a:t>Trie</a:t>
+            </a:r>
+            <a:endParaRPr lang="zh-CN" altLang="en-US" dirty="0"/>
+          </a:p>
+        </p:txBody>
+      </p:sp>
+      <p:sp>
+        <p:nvSpPr>
+          <p:cNvPr id="3" name="内容占位符 2"/>
+          <p:cNvSpPr>
+            <a:spLocks noGrp="1"/>
+          </p:cNvSpPr>
+          <p:nvPr>
+            <p:ph idx="1"/>
+          </p:nvPr>
+        </p:nvSpPr>
+        <p:spPr/>
+        <p:txBody>
+          <a:bodyPr/>
+          <a:lstStyle/>
+          <a:p>
+            <a:endParaRPr lang="zh-CN" altLang="en-US"/>
+          </a:p>
+        </p:txBody>
+      </p:sp>
+    </p:spTree>
+    <p:extLst>
+      <p:ext uri="{BB962C8B-B14F-4D97-AF65-F5344CB8AC3E}">
+        <p14:creationId xmlns:p14="http://schemas.microsoft.com/office/powerpoint/2010/main" val="3264625386"/>
+      </p:ext>
+    </p:extLst>
+  </p:cSld>
+  <p:clrMapOvr>
+    <a:masterClrMapping/>
+  </p:clrMapOvr>
+  <p:timing>
+    <p:tnLst>
+      <p:par>
+        <p:cTn id="1" dur="indefinite" restart="never" nodeType="tmRoot"/>
+      </p:par>
+    </p:tnLst>
+  </p:timing>
+</p:sld>
+</file>
+
+<file path=ppt/slides/slide45.xml><?xml version="1.0" encoding="utf-8"?>
+<p:sld xmlns:a="http://schemas.openxmlformats.org/drawingml/2006/main" xmlns:r="http://schemas.openxmlformats.org/officeDocument/2006/relationships" xmlns:p="http://schemas.openxmlformats.org/presentationml/2006/main">
+  <p:cSld>
+    <p:spTree>
+      <p:nvGrpSpPr>
+        <p:cNvPr id="1" name=""/>
+        <p:cNvGrpSpPr/>
+        <p:nvPr/>
+      </p:nvGrpSpPr>
+      <p:grpSpPr>
+        <a:xfrm>
+          <a:off x="0" y="0"/>
+          <a:ext cx="0" cy="0"/>
+          <a:chOff x="0" y="0"/>
+          <a:chExt cx="0" cy="0"/>
+        </a:xfrm>
+      </p:grpSpPr>
+      <p:sp>
+        <p:nvSpPr>
+          <p:cNvPr id="2" name="标题 1"/>
+          <p:cNvSpPr>
+            <a:spLocks noGrp="1"/>
+          </p:cNvSpPr>
+          <p:nvPr>
+            <p:ph type="title"/>
+          </p:nvPr>
+        </p:nvSpPr>
+        <p:spPr/>
+        <p:txBody>
+          <a:bodyPr/>
+          <a:lstStyle/>
+          <a:p>
+            <a:r>
+              <a:rPr lang="en-US" altLang="zh-CN" dirty="0" smtClean="0"/>
+              <a:t>Suffix Array</a:t>
+            </a:r>
+            <a:endParaRPr lang="zh-CN" altLang="en-US" dirty="0"/>
+          </a:p>
+        </p:txBody>
+      </p:sp>
+      <p:sp>
+        <p:nvSpPr>
+          <p:cNvPr id="3" name="内容占位符 2"/>
+          <p:cNvSpPr>
+            <a:spLocks noGrp="1"/>
+          </p:cNvSpPr>
+          <p:nvPr>
+            <p:ph idx="1"/>
+          </p:nvPr>
+        </p:nvSpPr>
+        <p:spPr/>
+        <p:txBody>
+          <a:bodyPr/>
+          <a:lstStyle/>
+          <a:p>
+            <a:endParaRPr lang="zh-CN" altLang="en-US"/>
+          </a:p>
+        </p:txBody>
+      </p:sp>
+    </p:spTree>
+    <p:extLst>
+      <p:ext uri="{BB962C8B-B14F-4D97-AF65-F5344CB8AC3E}">
+        <p14:creationId xmlns:p14="http://schemas.microsoft.com/office/powerpoint/2010/main" val="1014942496"/>
+      </p:ext>
+    </p:extLst>
+  </p:cSld>
+  <p:clrMapOvr>
+    <a:masterClrMapping/>
+  </p:clrMapOvr>
+  <p:timing>
+    <p:tnLst>
+      <p:par>
+        <p:cTn id="1" dur="indefinite" restart="never" nodeType="tmRoot"/>
+      </p:par>
+    </p:tnLst>
+  </p:timing>
+</p:sld>
+</file>
+
+<file path=ppt/slides/slide46.xml><?xml version="1.0" encoding="utf-8"?>
+<p:sld xmlns:a="http://schemas.openxmlformats.org/drawingml/2006/main" xmlns:r="http://schemas.openxmlformats.org/officeDocument/2006/relationships" xmlns:p="http://schemas.openxmlformats.org/presentationml/2006/main">
+  <p:cSld>
+    <p:spTree>
+      <p:nvGrpSpPr>
+        <p:cNvPr id="1" name=""/>
+        <p:cNvGrpSpPr/>
+        <p:nvPr/>
+      </p:nvGrpSpPr>
+      <p:grpSpPr>
+        <a:xfrm>
+          <a:off x="0" y="0"/>
+          <a:ext cx="0" cy="0"/>
+          <a:chOff x="0" y="0"/>
+          <a:chExt cx="0" cy="0"/>
+        </a:xfrm>
+      </p:grpSpPr>
+      <p:sp>
+        <p:nvSpPr>
+          <p:cNvPr id="2" name="标题 1"/>
+          <p:cNvSpPr>
+            <a:spLocks noGrp="1"/>
+          </p:cNvSpPr>
+          <p:nvPr>
+            <p:ph type="title"/>
+          </p:nvPr>
+        </p:nvSpPr>
+        <p:spPr/>
+        <p:txBody>
+          <a:bodyPr/>
+          <a:lstStyle/>
+          <a:p>
+            <a:r>
+              <a:rPr lang="en-US" altLang="zh-CN" dirty="0" err="1" smtClean="0"/>
+              <a:t>SkipList</a:t>
+            </a:r>
+            <a:endParaRPr lang="zh-CN" altLang="en-US" dirty="0"/>
+          </a:p>
+        </p:txBody>
+      </p:sp>
+      <p:sp>
+        <p:nvSpPr>
+          <p:cNvPr id="3" name="内容占位符 2"/>
+          <p:cNvSpPr>
+            <a:spLocks noGrp="1"/>
+          </p:cNvSpPr>
+          <p:nvPr>
+            <p:ph idx="1"/>
+          </p:nvPr>
+        </p:nvSpPr>
+        <p:spPr/>
+        <p:txBody>
+          <a:bodyPr/>
+          <a:lstStyle/>
+          <a:p>
+            <a:endParaRPr lang="zh-CN" altLang="en-US"/>
+          </a:p>
+        </p:txBody>
+      </p:sp>
+    </p:spTree>
+    <p:extLst>
+      <p:ext uri="{BB962C8B-B14F-4D97-AF65-F5344CB8AC3E}">
+        <p14:creationId xmlns:p14="http://schemas.microsoft.com/office/powerpoint/2010/main" val="1550362845"/>
+      </p:ext>
+    </p:extLst>
+  </p:cSld>
+  <p:clrMapOvr>
+    <a:masterClrMapping/>
+  </p:clrMapOvr>
+  <p:timing>
+    <p:tnLst>
+      <p:par>
+        <p:cTn id="1" dur="indefinite" restart="never" nodeType="tmRoot"/>
+      </p:par>
+    </p:tnLst>
+  </p:timing>
+</p:sld>
+</file>
+
+<file path=ppt/slides/slide47.xml><?xml version="1.0" encoding="utf-8"?>
+<p:sld xmlns:a="http://schemas.openxmlformats.org/drawingml/2006/main" xmlns:r="http://schemas.openxmlformats.org/officeDocument/2006/relationships" xmlns:p="http://schemas.openxmlformats.org/presentationml/2006/main">
+  <p:cSld>
+    <p:spTree>
+      <p:nvGrpSpPr>
+        <p:cNvPr id="1" name=""/>
+        <p:cNvGrpSpPr/>
+        <p:nvPr/>
+      </p:nvGrpSpPr>
+      <p:grpSpPr>
+        <a:xfrm>
+          <a:off x="0" y="0"/>
+          <a:ext cx="0" cy="0"/>
+          <a:chOff x="0" y="0"/>
+          <a:chExt cx="0" cy="0"/>
+        </a:xfrm>
+      </p:grpSpPr>
+      <p:sp>
+        <p:nvSpPr>
+          <p:cNvPr id="2" name="标题 1"/>
+          <p:cNvSpPr>
+            <a:spLocks noGrp="1"/>
+          </p:cNvSpPr>
+          <p:nvPr>
+            <p:ph type="title"/>
+          </p:nvPr>
+        </p:nvSpPr>
+        <p:spPr/>
+        <p:txBody>
+          <a:bodyPr/>
+          <a:lstStyle/>
+          <a:p>
+            <a:r>
+              <a:rPr lang="en-US" altLang="zh-CN" dirty="0" smtClean="0"/>
               <a:t>Data model in </a:t>
             </a:r>
             <a:r>
@@ -15216,7 +15840,7 @@
 </p:sld>
 </file>
 
-<file path=ppt/slides/slide44.xml><?xml version="1.0" encoding="utf-8"?>
+<file path=ppt/slides/slide48.xml><?xml version="1.0" encoding="utf-8"?>
 <p:sld xmlns:a="http://schemas.openxmlformats.org/drawingml/2006/main" xmlns:r="http://schemas.openxmlformats.org/officeDocument/2006/relationships" xmlns:p="http://schemas.openxmlformats.org/presentationml/2006/main">
   <p:cSld>
     <p:spTree>
@@ -15689,7 +16313,7 @@
 </p:sld>
 </file>
 
-<file path=ppt/slides/slide45.xml><?xml version="1.0" encoding="utf-8"?>
+<file path=ppt/slides/slide49.xml><?xml version="1.0" encoding="utf-8"?>
 <p:sld xmlns:a="http://schemas.openxmlformats.org/drawingml/2006/main" xmlns:r="http://schemas.openxmlformats.org/officeDocument/2006/relationships" xmlns:p="http://schemas.openxmlformats.org/presentationml/2006/main">
   <p:cSld>
     <p:spTree>
@@ -16123,369 +16747,6 @@
 </p:sld>
 </file>
 
-<file path=ppt/slides/slide46.xml><?xml version="1.0" encoding="utf-8"?>
-<p:sld xmlns:a="http://schemas.openxmlformats.org/drawingml/2006/main" xmlns:r="http://schemas.openxmlformats.org/officeDocument/2006/relationships" xmlns:p="http://schemas.openxmlformats.org/presentationml/2006/main">
-  <p:cSld>
-    <p:spTree>
-      <p:nvGrpSpPr>
-        <p:cNvPr id="1" name=""/>
-        <p:cNvGrpSpPr/>
-        <p:nvPr/>
-      </p:nvGrpSpPr>
-      <p:grpSpPr>
-        <a:xfrm>
-          <a:off x="0" y="0"/>
-          <a:ext cx="0" cy="0"/>
-          <a:chOff x="0" y="0"/>
-          <a:chExt cx="0" cy="0"/>
-        </a:xfrm>
-      </p:grpSpPr>
-      <p:sp>
-        <p:nvSpPr>
-          <p:cNvPr id="2" name="标题 1"/>
-          <p:cNvSpPr>
-            <a:spLocks noGrp="1"/>
-          </p:cNvSpPr>
-          <p:nvPr>
-            <p:ph type="title"/>
-          </p:nvPr>
-        </p:nvSpPr>
-        <p:spPr/>
-        <p:txBody>
-          <a:bodyPr/>
-          <a:lstStyle/>
-          <a:p>
-            <a:r>
-              <a:rPr lang="en-US" altLang="zh-CN" dirty="0" smtClean="0"/>
-              <a:t>LSM Tree</a:t>
-            </a:r>
-            <a:endParaRPr lang="zh-CN" altLang="en-US" dirty="0"/>
-          </a:p>
-        </p:txBody>
-      </p:sp>
-      <p:sp>
-        <p:nvSpPr>
-          <p:cNvPr id="3" name="内容占位符 2"/>
-          <p:cNvSpPr>
-            <a:spLocks noGrp="1"/>
-          </p:cNvSpPr>
-          <p:nvPr>
-            <p:ph idx="1"/>
-          </p:nvPr>
-        </p:nvSpPr>
-        <p:spPr/>
-        <p:txBody>
-          <a:bodyPr/>
-          <a:lstStyle/>
-          <a:p>
-            <a:endParaRPr lang="zh-CN" altLang="en-US"/>
-          </a:p>
-        </p:txBody>
-      </p:sp>
-    </p:spTree>
-    <p:extLst>
-      <p:ext uri="{BB962C8B-B14F-4D97-AF65-F5344CB8AC3E}">
-        <p14:creationId xmlns:p14="http://schemas.microsoft.com/office/powerpoint/2010/main" val="727106903"/>
-      </p:ext>
-    </p:extLst>
-  </p:cSld>
-  <p:clrMapOvr>
-    <a:masterClrMapping/>
-  </p:clrMapOvr>
-  <p:timing>
-    <p:tnLst>
-      <p:par>
-        <p:cTn id="1" dur="indefinite" restart="never" nodeType="tmRoot"/>
-      </p:par>
-    </p:tnLst>
-  </p:timing>
-</p:sld>
-</file>
-
-<file path=ppt/slides/slide47.xml><?xml version="1.0" encoding="utf-8"?>
-<p:sld xmlns:a="http://schemas.openxmlformats.org/drawingml/2006/main" xmlns:r="http://schemas.openxmlformats.org/officeDocument/2006/relationships" xmlns:p="http://schemas.openxmlformats.org/presentationml/2006/main">
-  <p:cSld>
-    <p:spTree>
-      <p:nvGrpSpPr>
-        <p:cNvPr id="1" name=""/>
-        <p:cNvGrpSpPr/>
-        <p:nvPr/>
-      </p:nvGrpSpPr>
-      <p:grpSpPr>
-        <a:xfrm>
-          <a:off x="0" y="0"/>
-          <a:ext cx="0" cy="0"/>
-          <a:chOff x="0" y="0"/>
-          <a:chExt cx="0" cy="0"/>
-        </a:xfrm>
-      </p:grpSpPr>
-      <p:sp>
-        <p:nvSpPr>
-          <p:cNvPr id="2" name="标题 1"/>
-          <p:cNvSpPr>
-            <a:spLocks noGrp="1"/>
-          </p:cNvSpPr>
-          <p:nvPr>
-            <p:ph type="title"/>
-          </p:nvPr>
-        </p:nvSpPr>
-        <p:spPr/>
-        <p:txBody>
-          <a:bodyPr/>
-          <a:lstStyle/>
-          <a:p>
-            <a:endParaRPr lang="zh-CN" altLang="en-US" dirty="0"/>
-          </a:p>
-        </p:txBody>
-      </p:sp>
-      <p:sp>
-        <p:nvSpPr>
-          <p:cNvPr id="3" name="内容占位符 2"/>
-          <p:cNvSpPr>
-            <a:spLocks noGrp="1"/>
-          </p:cNvSpPr>
-          <p:nvPr>
-            <p:ph idx="1"/>
-          </p:nvPr>
-        </p:nvSpPr>
-        <p:spPr/>
-        <p:txBody>
-          <a:bodyPr/>
-          <a:lstStyle/>
-          <a:p>
-            <a:r>
-              <a:rPr lang="en-US" altLang="zh-CN" dirty="0"/>
-              <a:t># of </a:t>
-            </a:r>
-            <a:r>
-              <a:rPr lang="en-US" altLang="zh-CN" dirty="0" smtClean="0"/>
-              <a:t>Cores(6)</a:t>
-            </a:r>
-            <a:endParaRPr lang="en-US" altLang="zh-CN" dirty="0"/>
-          </a:p>
-          <a:p>
-            <a:r>
-              <a:rPr lang="en-US" altLang="zh-CN" dirty="0"/>
-              <a:t>Cores is a hardware term that describes the number of independent central processing units in a single computing component (die or chip).</a:t>
-            </a:r>
-          </a:p>
-          <a:p>
-            <a:endParaRPr lang="zh-CN" altLang="en-US" dirty="0"/>
-          </a:p>
-        </p:txBody>
-      </p:sp>
-    </p:spTree>
-    <p:extLst>
-      <p:ext uri="{BB962C8B-B14F-4D97-AF65-F5344CB8AC3E}">
-        <p14:creationId xmlns:p14="http://schemas.microsoft.com/office/powerpoint/2010/main" val="802797849"/>
-      </p:ext>
-    </p:extLst>
-  </p:cSld>
-  <p:clrMapOvr>
-    <a:masterClrMapping/>
-  </p:clrMapOvr>
-  <p:timing>
-    <p:tnLst>
-      <p:par>
-        <p:cTn id="1" dur="indefinite" restart="never" nodeType="tmRoot"/>
-      </p:par>
-    </p:tnLst>
-  </p:timing>
-</p:sld>
-</file>
-
-<file path=ppt/slides/slide48.xml><?xml version="1.0" encoding="utf-8"?>
-<p:sld xmlns:a="http://schemas.openxmlformats.org/drawingml/2006/main" xmlns:r="http://schemas.openxmlformats.org/officeDocument/2006/relationships" xmlns:p="http://schemas.openxmlformats.org/presentationml/2006/main">
-  <p:cSld>
-    <p:spTree>
-      <p:nvGrpSpPr>
-        <p:cNvPr id="1" name=""/>
-        <p:cNvGrpSpPr/>
-        <p:nvPr/>
-      </p:nvGrpSpPr>
-      <p:grpSpPr>
-        <a:xfrm>
-          <a:off x="0" y="0"/>
-          <a:ext cx="0" cy="0"/>
-          <a:chOff x="0" y="0"/>
-          <a:chExt cx="0" cy="0"/>
-        </a:xfrm>
-      </p:grpSpPr>
-      <p:sp>
-        <p:nvSpPr>
-          <p:cNvPr id="2" name="标题 1"/>
-          <p:cNvSpPr>
-            <a:spLocks noGrp="1"/>
-          </p:cNvSpPr>
-          <p:nvPr>
-            <p:ph type="title"/>
-          </p:nvPr>
-        </p:nvSpPr>
-        <p:spPr/>
-        <p:txBody>
-          <a:bodyPr/>
-          <a:lstStyle/>
-          <a:p>
-            <a:endParaRPr lang="zh-CN" altLang="en-US"/>
-          </a:p>
-        </p:txBody>
-      </p:sp>
-      <p:sp>
-        <p:nvSpPr>
-          <p:cNvPr id="3" name="内容占位符 2"/>
-          <p:cNvSpPr>
-            <a:spLocks noGrp="1"/>
-          </p:cNvSpPr>
-          <p:nvPr>
-            <p:ph idx="1"/>
-          </p:nvPr>
-        </p:nvSpPr>
-        <p:spPr/>
-        <p:txBody>
-          <a:bodyPr/>
-          <a:lstStyle/>
-          <a:p>
-            <a:r>
-              <a:rPr lang="en-US" altLang="zh-CN" dirty="0"/>
-              <a:t># of </a:t>
-            </a:r>
-            <a:r>
-              <a:rPr lang="en-US" altLang="zh-CN" dirty="0" smtClean="0"/>
-              <a:t>Threads(12)</a:t>
-            </a:r>
-            <a:endParaRPr lang="en-US" altLang="zh-CN" dirty="0"/>
-          </a:p>
-          <a:p>
-            <a:r>
-              <a:rPr lang="en-US" altLang="zh-CN" dirty="0"/>
-              <a:t>A Thread, or thread of execution, is a software term for the basic ordered sequence of instructions that can be passed through or processed by a single CPU core.</a:t>
-            </a:r>
-          </a:p>
-          <a:p>
-            <a:endParaRPr lang="zh-CN" altLang="en-US" dirty="0"/>
-          </a:p>
-        </p:txBody>
-      </p:sp>
-    </p:spTree>
-    <p:extLst>
-      <p:ext uri="{BB962C8B-B14F-4D97-AF65-F5344CB8AC3E}">
-        <p14:creationId xmlns:p14="http://schemas.microsoft.com/office/powerpoint/2010/main" val="2959124188"/>
-      </p:ext>
-    </p:extLst>
-  </p:cSld>
-  <p:clrMapOvr>
-    <a:masterClrMapping/>
-  </p:clrMapOvr>
-  <p:timing>
-    <p:tnLst>
-      <p:par>
-        <p:cTn id="1" dur="indefinite" restart="never" nodeType="tmRoot"/>
-      </p:par>
-    </p:tnLst>
-  </p:timing>
-</p:sld>
-</file>
-
-<file path=ppt/slides/slide49.xml><?xml version="1.0" encoding="utf-8"?>
-<p:sld xmlns:a="http://schemas.openxmlformats.org/drawingml/2006/main" xmlns:r="http://schemas.openxmlformats.org/officeDocument/2006/relationships" xmlns:p="http://schemas.openxmlformats.org/presentationml/2006/main">
-  <p:cSld>
-    <p:spTree>
-      <p:nvGrpSpPr>
-        <p:cNvPr id="1" name=""/>
-        <p:cNvGrpSpPr/>
-        <p:nvPr/>
-      </p:nvGrpSpPr>
-      <p:grpSpPr>
-        <a:xfrm>
-          <a:off x="0" y="0"/>
-          <a:ext cx="0" cy="0"/>
-          <a:chOff x="0" y="0"/>
-          <a:chExt cx="0" cy="0"/>
-        </a:xfrm>
-      </p:grpSpPr>
-      <p:sp>
-        <p:nvSpPr>
-          <p:cNvPr id="2" name="标题 1"/>
-          <p:cNvSpPr>
-            <a:spLocks noGrp="1"/>
-          </p:cNvSpPr>
-          <p:nvPr>
-            <p:ph type="title"/>
-          </p:nvPr>
-        </p:nvSpPr>
-        <p:spPr/>
-        <p:txBody>
-          <a:bodyPr/>
-          <a:lstStyle/>
-          <a:p>
-            <a:endParaRPr lang="zh-CN" altLang="en-US"/>
-          </a:p>
-        </p:txBody>
-      </p:sp>
-      <p:sp>
-        <p:nvSpPr>
-          <p:cNvPr id="3" name="内容占位符 2"/>
-          <p:cNvSpPr>
-            <a:spLocks noGrp="1"/>
-          </p:cNvSpPr>
-          <p:nvPr>
-            <p:ph idx="1"/>
-          </p:nvPr>
-        </p:nvSpPr>
-        <p:spPr/>
-        <p:txBody>
-          <a:bodyPr/>
-          <a:lstStyle/>
-          <a:p>
-            <a:r>
-              <a:rPr lang="en-US" altLang="zh-CN" dirty="0"/>
-              <a:t>Processor Base </a:t>
-            </a:r>
-            <a:r>
-              <a:rPr lang="en-US" altLang="zh-CN" dirty="0" smtClean="0"/>
-              <a:t>Frequency(</a:t>
-            </a:r>
-            <a:r>
-              <a:rPr lang="en-US" altLang="zh-CN" dirty="0"/>
-              <a:t>2.00 GHz</a:t>
-            </a:r>
-            <a:r>
-              <a:rPr lang="en-US" altLang="zh-CN" dirty="0" smtClean="0"/>
-              <a:t>)</a:t>
-            </a:r>
-            <a:endParaRPr lang="en-US" altLang="zh-CN" dirty="0"/>
-          </a:p>
-          <a:p>
-            <a:r>
-              <a:rPr lang="en-US" altLang="zh-CN" dirty="0"/>
-              <a:t>Processor Base Frequency describes the rate at which the processor's transistors open and close. The processor base frequency is the operating point where TDP is defined. Frequency is measured in gigahertz (GHz), or billion cycles per second.</a:t>
-            </a:r>
-          </a:p>
-          <a:p>
-            <a:endParaRPr lang="zh-CN" altLang="en-US" dirty="0"/>
-          </a:p>
-        </p:txBody>
-      </p:sp>
-    </p:spTree>
-    <p:extLst>
-      <p:ext uri="{BB962C8B-B14F-4D97-AF65-F5344CB8AC3E}">
-        <p14:creationId xmlns:p14="http://schemas.microsoft.com/office/powerpoint/2010/main" val="3111507668"/>
-      </p:ext>
-    </p:extLst>
-  </p:cSld>
-  <p:clrMapOvr>
-    <a:masterClrMapping/>
-  </p:clrMapOvr>
-  <p:timing>
-    <p:tnLst>
-      <p:par>
-        <p:cTn id="1" dur="indefinite" restart="never" nodeType="tmRoot"/>
-      </p:par>
-    </p:tnLst>
-  </p:timing>
-</p:sld>
-</file>
-
 <file path=ppt/slides/slide5.xml><?xml version="1.0" encoding="utf-8"?>
 <p:sld xmlns:a="http://schemas.openxmlformats.org/drawingml/2006/main" xmlns:r="http://schemas.openxmlformats.org/officeDocument/2006/relationships" xmlns:p="http://schemas.openxmlformats.org/presentationml/2006/main">
   <p:cSld>
@@ -17711,46 +17972,37 @@
           <a:bodyPr/>
           <a:lstStyle/>
           <a:p>
+            <a:r>
+              <a:rPr lang="en-US" altLang="zh-CN" dirty="0" smtClean="0"/>
+              <a:t>LSM Tree</a:t>
+            </a:r>
+            <a:endParaRPr lang="zh-CN" altLang="en-US" dirty="0"/>
+          </a:p>
+        </p:txBody>
+      </p:sp>
+      <p:sp>
+        <p:nvSpPr>
+          <p:cNvPr id="3" name="内容占位符 2"/>
+          <p:cNvSpPr>
+            <a:spLocks noGrp="1"/>
+          </p:cNvSpPr>
+          <p:nvPr>
+            <p:ph idx="1"/>
+          </p:nvPr>
+        </p:nvSpPr>
+        <p:spPr/>
+        <p:txBody>
+          <a:bodyPr/>
+          <a:lstStyle/>
+          <a:p>
             <a:endParaRPr lang="zh-CN" altLang="en-US"/>
-          </a:p>
-        </p:txBody>
-      </p:sp>
-      <p:sp>
-        <p:nvSpPr>
-          <p:cNvPr id="3" name="内容占位符 2"/>
-          <p:cNvSpPr>
-            <a:spLocks noGrp="1"/>
-          </p:cNvSpPr>
-          <p:nvPr>
-            <p:ph idx="1"/>
-          </p:nvPr>
-        </p:nvSpPr>
-        <p:spPr/>
-        <p:txBody>
-          <a:bodyPr/>
-          <a:lstStyle/>
-          <a:p>
-            <a:r>
-              <a:rPr lang="en-US" altLang="zh-CN" dirty="0" smtClean="0"/>
-              <a:t>Cache(L1, L2, L3)</a:t>
-            </a:r>
-            <a:endParaRPr lang="en-US" altLang="zh-CN" dirty="0"/>
-          </a:p>
-          <a:p>
-            <a:r>
-              <a:rPr lang="en-US" altLang="zh-CN" dirty="0"/>
-              <a:t>CPU Cache is an area of fast memory located on the processor. Intel® Smart Cache refers to the architecture that allows all cores to dynamically share access to the last level cache.</a:t>
-            </a:r>
-          </a:p>
-          <a:p>
-            <a:endParaRPr lang="zh-CN" altLang="en-US" dirty="0"/>
           </a:p>
         </p:txBody>
       </p:sp>
     </p:spTree>
     <p:extLst>
       <p:ext uri="{BB962C8B-B14F-4D97-AF65-F5344CB8AC3E}">
-        <p14:creationId xmlns:p14="http://schemas.microsoft.com/office/powerpoint/2010/main" val="3563029695"/>
+        <p14:creationId xmlns:p14="http://schemas.microsoft.com/office/powerpoint/2010/main" val="727106903"/>
       </p:ext>
     </p:extLst>
   </p:cSld>
@@ -17799,6 +18051,378 @@
           <a:bodyPr/>
           <a:lstStyle/>
           <a:p>
+            <a:endParaRPr lang="zh-CN" altLang="en-US" dirty="0"/>
+          </a:p>
+        </p:txBody>
+      </p:sp>
+      <p:sp>
+        <p:nvSpPr>
+          <p:cNvPr id="3" name="内容占位符 2"/>
+          <p:cNvSpPr>
+            <a:spLocks noGrp="1"/>
+          </p:cNvSpPr>
+          <p:nvPr>
+            <p:ph idx="1"/>
+          </p:nvPr>
+        </p:nvSpPr>
+        <p:spPr/>
+        <p:txBody>
+          <a:bodyPr/>
+          <a:lstStyle/>
+          <a:p>
+            <a:r>
+              <a:rPr lang="en-US" altLang="zh-CN" dirty="0"/>
+              <a:t># of </a:t>
+            </a:r>
+            <a:r>
+              <a:rPr lang="en-US" altLang="zh-CN" dirty="0" smtClean="0"/>
+              <a:t>Cores(6)</a:t>
+            </a:r>
+            <a:endParaRPr lang="en-US" altLang="zh-CN" dirty="0"/>
+          </a:p>
+          <a:p>
+            <a:r>
+              <a:rPr lang="en-US" altLang="zh-CN" dirty="0"/>
+              <a:t>Cores is a hardware term that describes the number of independent central processing units in a single computing component (die or chip).</a:t>
+            </a:r>
+          </a:p>
+          <a:p>
+            <a:endParaRPr lang="zh-CN" altLang="en-US" dirty="0"/>
+          </a:p>
+        </p:txBody>
+      </p:sp>
+    </p:spTree>
+    <p:extLst>
+      <p:ext uri="{BB962C8B-B14F-4D97-AF65-F5344CB8AC3E}">
+        <p14:creationId xmlns:p14="http://schemas.microsoft.com/office/powerpoint/2010/main" val="802797849"/>
+      </p:ext>
+    </p:extLst>
+  </p:cSld>
+  <p:clrMapOvr>
+    <a:masterClrMapping/>
+  </p:clrMapOvr>
+  <p:timing>
+    <p:tnLst>
+      <p:par>
+        <p:cTn id="1" dur="indefinite" restart="never" nodeType="tmRoot"/>
+      </p:par>
+    </p:tnLst>
+  </p:timing>
+</p:sld>
+</file>
+
+<file path=ppt/slides/slide52.xml><?xml version="1.0" encoding="utf-8"?>
+<p:sld xmlns:a="http://schemas.openxmlformats.org/drawingml/2006/main" xmlns:r="http://schemas.openxmlformats.org/officeDocument/2006/relationships" xmlns:p="http://schemas.openxmlformats.org/presentationml/2006/main">
+  <p:cSld>
+    <p:spTree>
+      <p:nvGrpSpPr>
+        <p:cNvPr id="1" name=""/>
+        <p:cNvGrpSpPr/>
+        <p:nvPr/>
+      </p:nvGrpSpPr>
+      <p:grpSpPr>
+        <a:xfrm>
+          <a:off x="0" y="0"/>
+          <a:ext cx="0" cy="0"/>
+          <a:chOff x="0" y="0"/>
+          <a:chExt cx="0" cy="0"/>
+        </a:xfrm>
+      </p:grpSpPr>
+      <p:sp>
+        <p:nvSpPr>
+          <p:cNvPr id="2" name="标题 1"/>
+          <p:cNvSpPr>
+            <a:spLocks noGrp="1"/>
+          </p:cNvSpPr>
+          <p:nvPr>
+            <p:ph type="title"/>
+          </p:nvPr>
+        </p:nvSpPr>
+        <p:spPr/>
+        <p:txBody>
+          <a:bodyPr/>
+          <a:lstStyle/>
+          <a:p>
+            <a:endParaRPr lang="zh-CN" altLang="en-US"/>
+          </a:p>
+        </p:txBody>
+      </p:sp>
+      <p:sp>
+        <p:nvSpPr>
+          <p:cNvPr id="3" name="内容占位符 2"/>
+          <p:cNvSpPr>
+            <a:spLocks noGrp="1"/>
+          </p:cNvSpPr>
+          <p:nvPr>
+            <p:ph idx="1"/>
+          </p:nvPr>
+        </p:nvSpPr>
+        <p:spPr/>
+        <p:txBody>
+          <a:bodyPr/>
+          <a:lstStyle/>
+          <a:p>
+            <a:r>
+              <a:rPr lang="en-US" altLang="zh-CN" dirty="0"/>
+              <a:t># of </a:t>
+            </a:r>
+            <a:r>
+              <a:rPr lang="en-US" altLang="zh-CN" dirty="0" smtClean="0"/>
+              <a:t>Threads(12)</a:t>
+            </a:r>
+            <a:endParaRPr lang="en-US" altLang="zh-CN" dirty="0"/>
+          </a:p>
+          <a:p>
+            <a:r>
+              <a:rPr lang="en-US" altLang="zh-CN" dirty="0"/>
+              <a:t>A Thread, or thread of execution, is a software term for the basic ordered sequence of instructions that can be passed through or processed by a single CPU core.</a:t>
+            </a:r>
+          </a:p>
+          <a:p>
+            <a:endParaRPr lang="zh-CN" altLang="en-US" dirty="0"/>
+          </a:p>
+        </p:txBody>
+      </p:sp>
+    </p:spTree>
+    <p:extLst>
+      <p:ext uri="{BB962C8B-B14F-4D97-AF65-F5344CB8AC3E}">
+        <p14:creationId xmlns:p14="http://schemas.microsoft.com/office/powerpoint/2010/main" val="2959124188"/>
+      </p:ext>
+    </p:extLst>
+  </p:cSld>
+  <p:clrMapOvr>
+    <a:masterClrMapping/>
+  </p:clrMapOvr>
+  <p:timing>
+    <p:tnLst>
+      <p:par>
+        <p:cTn id="1" dur="indefinite" restart="never" nodeType="tmRoot"/>
+      </p:par>
+    </p:tnLst>
+  </p:timing>
+</p:sld>
+</file>
+
+<file path=ppt/slides/slide53.xml><?xml version="1.0" encoding="utf-8"?>
+<p:sld xmlns:a="http://schemas.openxmlformats.org/drawingml/2006/main" xmlns:r="http://schemas.openxmlformats.org/officeDocument/2006/relationships" xmlns:p="http://schemas.openxmlformats.org/presentationml/2006/main">
+  <p:cSld>
+    <p:spTree>
+      <p:nvGrpSpPr>
+        <p:cNvPr id="1" name=""/>
+        <p:cNvGrpSpPr/>
+        <p:nvPr/>
+      </p:nvGrpSpPr>
+      <p:grpSpPr>
+        <a:xfrm>
+          <a:off x="0" y="0"/>
+          <a:ext cx="0" cy="0"/>
+          <a:chOff x="0" y="0"/>
+          <a:chExt cx="0" cy="0"/>
+        </a:xfrm>
+      </p:grpSpPr>
+      <p:sp>
+        <p:nvSpPr>
+          <p:cNvPr id="2" name="标题 1"/>
+          <p:cNvSpPr>
+            <a:spLocks noGrp="1"/>
+          </p:cNvSpPr>
+          <p:nvPr>
+            <p:ph type="title"/>
+          </p:nvPr>
+        </p:nvSpPr>
+        <p:spPr/>
+        <p:txBody>
+          <a:bodyPr/>
+          <a:lstStyle/>
+          <a:p>
+            <a:endParaRPr lang="zh-CN" altLang="en-US"/>
+          </a:p>
+        </p:txBody>
+      </p:sp>
+      <p:sp>
+        <p:nvSpPr>
+          <p:cNvPr id="3" name="内容占位符 2"/>
+          <p:cNvSpPr>
+            <a:spLocks noGrp="1"/>
+          </p:cNvSpPr>
+          <p:nvPr>
+            <p:ph idx="1"/>
+          </p:nvPr>
+        </p:nvSpPr>
+        <p:spPr/>
+        <p:txBody>
+          <a:bodyPr/>
+          <a:lstStyle/>
+          <a:p>
+            <a:r>
+              <a:rPr lang="en-US" altLang="zh-CN" dirty="0"/>
+              <a:t>Processor Base </a:t>
+            </a:r>
+            <a:r>
+              <a:rPr lang="en-US" altLang="zh-CN" dirty="0" smtClean="0"/>
+              <a:t>Frequency(</a:t>
+            </a:r>
+            <a:r>
+              <a:rPr lang="en-US" altLang="zh-CN" dirty="0"/>
+              <a:t>2.00 GHz</a:t>
+            </a:r>
+            <a:r>
+              <a:rPr lang="en-US" altLang="zh-CN" dirty="0" smtClean="0"/>
+              <a:t>)</a:t>
+            </a:r>
+            <a:endParaRPr lang="en-US" altLang="zh-CN" dirty="0"/>
+          </a:p>
+          <a:p>
+            <a:r>
+              <a:rPr lang="en-US" altLang="zh-CN" dirty="0"/>
+              <a:t>Processor Base Frequency describes the rate at which the processor's transistors open and close. The processor base frequency is the operating point where TDP is defined. Frequency is measured in gigahertz (GHz), or billion cycles per second.</a:t>
+            </a:r>
+          </a:p>
+          <a:p>
+            <a:endParaRPr lang="zh-CN" altLang="en-US" dirty="0"/>
+          </a:p>
+        </p:txBody>
+      </p:sp>
+    </p:spTree>
+    <p:extLst>
+      <p:ext uri="{BB962C8B-B14F-4D97-AF65-F5344CB8AC3E}">
+        <p14:creationId xmlns:p14="http://schemas.microsoft.com/office/powerpoint/2010/main" val="3111507668"/>
+      </p:ext>
+    </p:extLst>
+  </p:cSld>
+  <p:clrMapOvr>
+    <a:masterClrMapping/>
+  </p:clrMapOvr>
+  <p:timing>
+    <p:tnLst>
+      <p:par>
+        <p:cTn id="1" dur="indefinite" restart="never" nodeType="tmRoot"/>
+      </p:par>
+    </p:tnLst>
+  </p:timing>
+</p:sld>
+</file>
+
+<file path=ppt/slides/slide54.xml><?xml version="1.0" encoding="utf-8"?>
+<p:sld xmlns:a="http://schemas.openxmlformats.org/drawingml/2006/main" xmlns:r="http://schemas.openxmlformats.org/officeDocument/2006/relationships" xmlns:p="http://schemas.openxmlformats.org/presentationml/2006/main">
+  <p:cSld>
+    <p:spTree>
+      <p:nvGrpSpPr>
+        <p:cNvPr id="1" name=""/>
+        <p:cNvGrpSpPr/>
+        <p:nvPr/>
+      </p:nvGrpSpPr>
+      <p:grpSpPr>
+        <a:xfrm>
+          <a:off x="0" y="0"/>
+          <a:ext cx="0" cy="0"/>
+          <a:chOff x="0" y="0"/>
+          <a:chExt cx="0" cy="0"/>
+        </a:xfrm>
+      </p:grpSpPr>
+      <p:sp>
+        <p:nvSpPr>
+          <p:cNvPr id="2" name="标题 1"/>
+          <p:cNvSpPr>
+            <a:spLocks noGrp="1"/>
+          </p:cNvSpPr>
+          <p:nvPr>
+            <p:ph type="title"/>
+          </p:nvPr>
+        </p:nvSpPr>
+        <p:spPr/>
+        <p:txBody>
+          <a:bodyPr/>
+          <a:lstStyle/>
+          <a:p>
+            <a:endParaRPr lang="zh-CN" altLang="en-US"/>
+          </a:p>
+        </p:txBody>
+      </p:sp>
+      <p:sp>
+        <p:nvSpPr>
+          <p:cNvPr id="3" name="内容占位符 2"/>
+          <p:cNvSpPr>
+            <a:spLocks noGrp="1"/>
+          </p:cNvSpPr>
+          <p:nvPr>
+            <p:ph idx="1"/>
+          </p:nvPr>
+        </p:nvSpPr>
+        <p:spPr/>
+        <p:txBody>
+          <a:bodyPr/>
+          <a:lstStyle/>
+          <a:p>
+            <a:r>
+              <a:rPr lang="en-US" altLang="zh-CN" dirty="0" smtClean="0"/>
+              <a:t>Cache(L1, L2, L3)</a:t>
+            </a:r>
+            <a:endParaRPr lang="en-US" altLang="zh-CN" dirty="0"/>
+          </a:p>
+          <a:p>
+            <a:r>
+              <a:rPr lang="en-US" altLang="zh-CN" dirty="0"/>
+              <a:t>CPU Cache is an area of fast memory located on the processor. Intel® Smart Cache refers to the architecture that allows all cores to dynamically share access to the last level cache.</a:t>
+            </a:r>
+          </a:p>
+          <a:p>
+            <a:endParaRPr lang="zh-CN" altLang="en-US" dirty="0"/>
+          </a:p>
+        </p:txBody>
+      </p:sp>
+    </p:spTree>
+    <p:extLst>
+      <p:ext uri="{BB962C8B-B14F-4D97-AF65-F5344CB8AC3E}">
+        <p14:creationId xmlns:p14="http://schemas.microsoft.com/office/powerpoint/2010/main" val="3563029695"/>
+      </p:ext>
+    </p:extLst>
+  </p:cSld>
+  <p:clrMapOvr>
+    <a:masterClrMapping/>
+  </p:clrMapOvr>
+  <p:timing>
+    <p:tnLst>
+      <p:par>
+        <p:cTn id="1" dur="indefinite" restart="never" nodeType="tmRoot"/>
+      </p:par>
+    </p:tnLst>
+  </p:timing>
+</p:sld>
+</file>
+
+<file path=ppt/slides/slide55.xml><?xml version="1.0" encoding="utf-8"?>
+<p:sld xmlns:a="http://schemas.openxmlformats.org/drawingml/2006/main" xmlns:r="http://schemas.openxmlformats.org/officeDocument/2006/relationships" xmlns:p="http://schemas.openxmlformats.org/presentationml/2006/main">
+  <p:cSld>
+    <p:spTree>
+      <p:nvGrpSpPr>
+        <p:cNvPr id="1" name=""/>
+        <p:cNvGrpSpPr/>
+        <p:nvPr/>
+      </p:nvGrpSpPr>
+      <p:grpSpPr>
+        <a:xfrm>
+          <a:off x="0" y="0"/>
+          <a:ext cx="0" cy="0"/>
+          <a:chOff x="0" y="0"/>
+          <a:chExt cx="0" cy="0"/>
+        </a:xfrm>
+      </p:grpSpPr>
+      <p:sp>
+        <p:nvSpPr>
+          <p:cNvPr id="2" name="标题 1"/>
+          <p:cNvSpPr>
+            <a:spLocks noGrp="1"/>
+          </p:cNvSpPr>
+          <p:nvPr>
+            <p:ph type="title"/>
+          </p:nvPr>
+        </p:nvSpPr>
+        <p:spPr/>
+        <p:txBody>
+          <a:bodyPr/>
+          <a:lstStyle/>
+          <a:p>
             <a:r>
               <a:rPr lang="en-US" altLang="zh-CN" dirty="0" smtClean="0"/>
               <a:t>Reference</a:t>
@@ -17820,7 +18444,7 @@
         <p:spPr/>
         <p:txBody>
           <a:bodyPr>
-            <a:normAutofit fontScale="62500" lnSpcReduction="20000"/>
+            <a:normAutofit fontScale="55000" lnSpcReduction="20000"/>
           </a:bodyPr>
           <a:lstStyle/>
           <a:p>
@@ -17933,100 +18557,139 @@
               <a:rPr lang="en-US" altLang="zh-CN" sz="2800" dirty="0" smtClean="0"/>
               <a:t> </a:t>
             </a:r>
-          </a:p>
-          <a:p>
-            <a:r>
-              <a:rPr lang="en-US" altLang="zh-CN" dirty="0">
+            <a:endParaRPr lang="en-US" altLang="zh-CN" sz="2800" dirty="0" smtClean="0"/>
+          </a:p>
+          <a:p>
+            <a:r>
+              <a:rPr lang="en-US" altLang="zh-CN" sz="2800" dirty="0">
                 <a:hlinkClick r:id="rId9"/>
               </a:rPr>
               <a:t>https://</a:t>
             </a:r>
             <a:r>
-              <a:rPr lang="en-US" altLang="zh-CN" dirty="0" smtClean="0">
+              <a:rPr lang="en-US" altLang="zh-CN" sz="2800" dirty="0" smtClean="0">
                 <a:hlinkClick r:id="rId9"/>
               </a:rPr>
+              <a:t>en.wikipedia.org/wiki/Disk_sector</a:t>
+            </a:r>
+            <a:r>
+              <a:rPr lang="en-US" altLang="zh-CN" sz="2800" dirty="0" smtClean="0"/>
+              <a:t> </a:t>
+            </a:r>
+            <a:endParaRPr lang="en-US" altLang="zh-CN" sz="2800" dirty="0" smtClean="0"/>
+          </a:p>
+          <a:p>
+            <a:r>
+              <a:rPr lang="en-US" altLang="zh-CN" sz="2700" dirty="0">
+                <a:hlinkClick r:id="rId10"/>
+              </a:rPr>
+              <a:t>https://</a:t>
+            </a:r>
+            <a:r>
+              <a:rPr lang="en-US" altLang="zh-CN" sz="2700" dirty="0">
+                <a:hlinkClick r:id="rId10"/>
+              </a:rPr>
               <a:t>en.wikipedia.org/wiki/Cylinder-head-sector</a:t>
             </a:r>
-            <a:endParaRPr lang="en-US" altLang="zh-CN" dirty="0" smtClean="0"/>
-          </a:p>
-          <a:p>
-            <a:r>
-              <a:rPr lang="en-US" altLang="zh-CN" dirty="0">
-                <a:hlinkClick r:id="rId10"/>
+            <a:endParaRPr lang="en-US" altLang="zh-CN" sz="2700" dirty="0"/>
+          </a:p>
+          <a:p>
+            <a:r>
+              <a:rPr lang="en-US" altLang="zh-CN" sz="2700" dirty="0">
+                <a:hlinkClick r:id="rId11"/>
+              </a:rPr>
+              <a:t>https://</a:t>
+            </a:r>
+            <a:r>
+              <a:rPr lang="en-US" altLang="zh-CN" sz="2700" dirty="0">
+                <a:hlinkClick r:id="rId11"/>
+              </a:rPr>
+              <a:t>en.wikipedia.org/wiki/Zone_bit_recording</a:t>
+            </a:r>
+            <a:endParaRPr lang="en-US" altLang="zh-CN" sz="2700" dirty="0"/>
+          </a:p>
+          <a:p>
+            <a:r>
+              <a:rPr lang="en-US" altLang="zh-CN" sz="2700" dirty="0">
+                <a:hlinkClick r:id="rId12"/>
+              </a:rPr>
+              <a:t>http</a:t>
+            </a:r>
+            <a:r>
+              <a:rPr lang="en-US" altLang="zh-CN" sz="2700" dirty="0">
+                <a:hlinkClick r:id="rId12"/>
+              </a:rPr>
+              <a:t>://</a:t>
+            </a:r>
+            <a:r>
+              <a:rPr lang="en-US" altLang="zh-CN" sz="2700" dirty="0">
+                <a:hlinkClick r:id="rId12"/>
+              </a:rPr>
+              <a:t>www.tldp.org/LDP/sag/html/hard-disk.html</a:t>
+            </a:r>
+            <a:endParaRPr lang="en-US" altLang="zh-CN" sz="2700" dirty="0"/>
+          </a:p>
+          <a:p>
+            <a:r>
+              <a:rPr lang="en-US" altLang="zh-CN" sz="2700" dirty="0">
+                <a:hlinkClick r:id="rId13"/>
+              </a:rPr>
+              <a:t>https://</a:t>
+            </a:r>
+            <a:r>
+              <a:rPr lang="en-US" altLang="zh-CN" sz="2700" dirty="0">
+                <a:hlinkClick r:id="rId13"/>
+              </a:rPr>
+              <a:t>www.youtube.com/watch?v=Cj8-WNjaGuM&amp;list=PLlVZ1eXuYslrb9G6xm4SKV51SO-KAFrCw&amp;index=1&amp;t=12s</a:t>
+            </a:r>
+            <a:endParaRPr lang="en-US" altLang="zh-CN" sz="2700" dirty="0"/>
+          </a:p>
+          <a:p>
+            <a:r>
+              <a:rPr lang="en-US" altLang="zh-CN" sz="2700" dirty="0">
+                <a:hlinkClick r:id="rId14"/>
               </a:rPr>
               <a:t>http://</a:t>
             </a:r>
             <a:r>
-              <a:rPr lang="en-US" altLang="zh-CN" dirty="0" smtClean="0">
-                <a:hlinkClick r:id="rId10"/>
-              </a:rPr>
-              <a:t>www.tldp.org/LDP/sag/html/hard-disk.html</a:t>
-            </a:r>
-            <a:endParaRPr lang="en-US" altLang="zh-CN" dirty="0" smtClean="0"/>
-          </a:p>
-          <a:p>
-            <a:r>
-              <a:rPr lang="en-US" altLang="zh-CN" dirty="0">
-                <a:hlinkClick r:id="rId11"/>
-              </a:rPr>
-              <a:t>https://</a:t>
-            </a:r>
-            <a:r>
-              <a:rPr lang="en-US" altLang="zh-CN" dirty="0" smtClean="0">
-                <a:hlinkClick r:id="rId11"/>
-              </a:rPr>
-              <a:t>www.youtube.com/watch?v=Cj8-WNjaGuM&amp;list=PLlVZ1eXuYslrb9G6xm4SKV51SO-KAFrCw&amp;index=1&amp;t=12s</a:t>
-            </a:r>
-            <a:endParaRPr lang="en-US" altLang="zh-CN" dirty="0" smtClean="0"/>
-          </a:p>
-          <a:p>
-            <a:r>
-              <a:rPr lang="en-US" altLang="zh-CN" dirty="0">
-                <a:hlinkClick r:id="rId12"/>
-              </a:rPr>
-              <a:t>http://</a:t>
-            </a:r>
-            <a:r>
-              <a:rPr lang="en-US" altLang="zh-CN" dirty="0" smtClean="0">
-                <a:hlinkClick r:id="rId12"/>
+              <a:rPr lang="en-US" altLang="zh-CN" sz="2700" dirty="0">
+                <a:hlinkClick r:id="rId14"/>
               </a:rPr>
               <a:t>blog.csdn.net/hguisu/article/details/7408047</a:t>
             </a:r>
-            <a:endParaRPr lang="en-US" altLang="zh-CN" dirty="0" smtClean="0"/>
-          </a:p>
-          <a:p>
-            <a:r>
-              <a:rPr lang="en-US" altLang="zh-CN" dirty="0">
-                <a:hlinkClick r:id="rId13"/>
-              </a:rPr>
-              <a:t>https://</a:t>
-            </a:r>
-            <a:r>
-              <a:rPr lang="en-US" altLang="zh-CN" dirty="0" smtClean="0">
-                <a:hlinkClick r:id="rId13"/>
-              </a:rPr>
-              <a:t>en.wikipedia.org/wiki/Zone_bit_recording</a:t>
-            </a:r>
-            <a:endParaRPr lang="en-US" altLang="zh-CN" dirty="0" smtClean="0"/>
-          </a:p>
-          <a:p>
-            <a:r>
-              <a:rPr lang="en-US" altLang="zh-CN" dirty="0">
-                <a:hlinkClick r:id="rId14"/>
-              </a:rPr>
-              <a:t>http://</a:t>
-            </a:r>
-            <a:r>
-              <a:rPr lang="en-US" altLang="zh-CN" dirty="0" smtClean="0">
-                <a:hlinkClick r:id="rId14"/>
-              </a:rPr>
-              <a:t>www.pcguide.com/ref/hdd/geom/tracksZBR-c.html</a:t>
-            </a:r>
-            <a:r>
-              <a:rPr lang="en-US" altLang="zh-CN" dirty="0" smtClean="0"/>
+            <a:endParaRPr lang="en-US" altLang="zh-CN" sz="2700" dirty="0"/>
+          </a:p>
+          <a:p>
+            <a:r>
+              <a:rPr lang="en-US" altLang="zh-CN" sz="2700" dirty="0">
+                <a:hlinkClick r:id="rId15"/>
+              </a:rPr>
+              <a:t>http://www.pcguide.com/ref/hdd/geom/tracksZBR-c.html</a:t>
+            </a:r>
+            <a:r>
+              <a:rPr lang="en-US" altLang="zh-CN" sz="2700" dirty="0"/>
               <a:t> </a:t>
             </a:r>
-            <a:endParaRPr lang="zh-CN" altLang="en-US" dirty="0"/>
+            <a:endParaRPr lang="en-US" altLang="zh-CN" sz="2700" dirty="0" smtClean="0"/>
+          </a:p>
+          <a:p>
+            <a:r>
+              <a:rPr lang="en-US" altLang="zh-CN" sz="2700" dirty="0">
+                <a:hlinkClick r:id="rId16"/>
+              </a:rPr>
+              <a:t>https://www.cs.uic.edu/~</a:t>
+            </a:r>
+            <a:r>
+              <a:rPr lang="en-US" altLang="zh-CN" sz="2700" dirty="0" smtClean="0">
+                <a:hlinkClick r:id="rId16"/>
+              </a:rPr>
+              <a:t>jbell/CourseNotes/OperatingSystems/10_MassStorage.html</a:t>
+            </a:r>
+            <a:r>
+              <a:rPr lang="en-US" altLang="zh-CN" sz="2700" dirty="0" smtClean="0"/>
+              <a:t> </a:t>
+            </a:r>
+            <a:endParaRPr lang="zh-CN" altLang="en-US" sz="2700" dirty="0"/>
           </a:p>
         </p:txBody>
       </p:sp>

</xml_diff>